<commit_message>
Created: menu pages, updated sidebar and navigation bar, updated menu, updated header
</commit_message>
<xml_diff>
--- a/Event Organizer App/app_images/App_Images.pptx
+++ b/Event Organizer App/app_images/App_Images.pptx
@@ -5,8 +5,7 @@
     <p:sldMasterId id="2147483648" r:id="rId1"/>
   </p:sldMasterIdLst>
   <p:sldIdLst>
-    <p:sldId id="256" r:id="rId2"/>
-    <p:sldId id="257" r:id="rId3"/>
+    <p:sldId id="257" r:id="rId2"/>
   </p:sldIdLst>
   <p:sldSz cx="12192000" cy="6858000"/>
   <p:notesSz cx="6858000" cy="9144000"/>
@@ -105,6 +104,11 @@
       </a:defRPr>
     </a:lvl9pPr>
   </p:defaultTextStyle>
+  <p:extLst>
+    <p:ext uri="{EFAFB233-063F-42B5-8137-9DF3F51BA10A}">
+      <p15:sldGuideLst xmlns:p15="http://schemas.microsoft.com/office/powerpoint/2012/main"/>
+    </p:ext>
+  </p:extLst>
 </p:presentation>
 </file>
 
@@ -3322,86 +3326,45 @@
           <a:chExt cx="0" cy="0"/>
         </a:xfrm>
       </p:grpSpPr>
-      <p:sp>
-        <p:nvSpPr>
-          <p:cNvPr id="2" name="Title 1">
-            <a:extLst>
-              <a:ext uri="{FF2B5EF4-FFF2-40B4-BE49-F238E27FC236}">
-                <a16:creationId xmlns:a16="http://schemas.microsoft.com/office/drawing/2014/main" id="{C513AAC1-C01B-BF28-06D7-205AFC076CDB}"/>
-              </a:ext>
-            </a:extLst>
-          </p:cNvPr>
-          <p:cNvSpPr>
-            <a:spLocks noGrp="1"/>
-          </p:cNvSpPr>
-          <p:nvPr>
-            <p:ph type="ctrTitle"/>
-          </p:nvPr>
-        </p:nvSpPr>
-        <p:spPr/>
-        <p:txBody>
-          <a:bodyPr/>
-          <a:lstStyle/>
-          <a:p>
-            <a:endParaRPr lang="en-US"/>
-          </a:p>
-        </p:txBody>
-      </p:sp>
-      <p:sp>
-        <p:nvSpPr>
-          <p:cNvPr id="3" name="Subtitle 2">
-            <a:extLst>
-              <a:ext uri="{FF2B5EF4-FFF2-40B4-BE49-F238E27FC236}">
-                <a16:creationId xmlns:a16="http://schemas.microsoft.com/office/drawing/2014/main" id="{5EC5BF37-D608-AB5C-5A7C-A7F49ACA99FB}"/>
-              </a:ext>
-            </a:extLst>
-          </p:cNvPr>
-          <p:cNvSpPr>
-            <a:spLocks noGrp="1"/>
-          </p:cNvSpPr>
-          <p:nvPr>
-            <p:ph type="subTitle" idx="1"/>
-          </p:nvPr>
-        </p:nvSpPr>
-        <p:spPr/>
-        <p:txBody>
-          <a:bodyPr/>
-          <a:lstStyle/>
-          <a:p>
-            <a:endParaRPr lang="en-US"/>
-          </a:p>
-        </p:txBody>
-      </p:sp>
-    </p:spTree>
-    <p:extLst>
-      <p:ext uri="{BB962C8B-B14F-4D97-AF65-F5344CB8AC3E}">
-        <p14:creationId xmlns:p14="http://schemas.microsoft.com/office/powerpoint/2010/main" val="271989849"/>
-      </p:ext>
-    </p:extLst>
-  </p:cSld>
-  <p:clrMapOvr>
-    <a:masterClrMapping/>
-  </p:clrMapOvr>
-</p:sld>
-</file>
-
-<file path=ppt/slides/slide2.xml><?xml version="1.0" encoding="utf-8"?>
-<p:sld xmlns:a="http://schemas.openxmlformats.org/drawingml/2006/main" xmlns:r="http://schemas.openxmlformats.org/officeDocument/2006/relationships" xmlns:p="http://schemas.openxmlformats.org/presentationml/2006/main">
-  <p:cSld>
-    <p:spTree>
-      <p:nvGrpSpPr>
-        <p:cNvPr id="1" name=""/>
-        <p:cNvGrpSpPr/>
-        <p:nvPr/>
-      </p:nvGrpSpPr>
-      <p:grpSpPr>
-        <a:xfrm>
-          <a:off x="0" y="0"/>
-          <a:ext cx="0" cy="0"/>
-          <a:chOff x="0" y="0"/>
-          <a:chExt cx="0" cy="0"/>
-        </a:xfrm>
-      </p:grpSpPr>
+      <p:pic>
+        <p:nvPicPr>
+          <p:cNvPr id="10" name="Graphic 9" descr="Folder with solid fill">
+            <a:extLst>
+              <a:ext uri="{FF2B5EF4-FFF2-40B4-BE49-F238E27FC236}">
+                <a16:creationId xmlns:a16="http://schemas.microsoft.com/office/drawing/2014/main" id="{C92B17DF-42EF-0971-70CA-69BB0D0CF50E}"/>
+              </a:ext>
+            </a:extLst>
+          </p:cNvPr>
+          <p:cNvPicPr>
+            <a:picLocks noChangeAspect="1"/>
+          </p:cNvPicPr>
+          <p:nvPr/>
+        </p:nvPicPr>
+        <p:blipFill>
+          <a:blip r:embed="rId2">
+            <a:extLst>
+              <a:ext uri="{28A0092B-C50C-407E-A947-70E740481C1C}">
+                <a14:useLocalDpi xmlns:a14="http://schemas.microsoft.com/office/drawing/2010/main" val="0"/>
+              </a:ext>
+              <a:ext uri="{96DAC541-7B7A-43D3-8B79-37D633B846F1}">
+                <asvg:svgBlip xmlns:asvg="http://schemas.microsoft.com/office/drawing/2016/SVG/main" r:embed="rId3"/>
+              </a:ext>
+            </a:extLst>
+          </a:blip>
+          <a:stretch>
+            <a:fillRect/>
+          </a:stretch>
+        </p:blipFill>
+        <p:spPr>
+          <a:xfrm>
+            <a:off x="2069514" y="3794328"/>
+            <a:ext cx="1673352" cy="1673352"/>
+          </a:xfrm>
+          <a:prstGeom prst="rect">
+            <a:avLst/>
+          </a:prstGeom>
+        </p:spPr>
+      </p:pic>
       <p:pic>
         <p:nvPicPr>
           <p:cNvPr id="1026" name="Picture 2" descr="Male user avatar icon in flat design style. Person signs illustration.  19896008 PNG">
@@ -3417,7 +3380,7 @@
           <p:nvPr/>
         </p:nvPicPr>
         <p:blipFill>
-          <a:blip r:embed="rId2">
+          <a:blip r:embed="rId4">
             <a:extLst>
               <a:ext uri="{28A0092B-C50C-407E-A947-70E740481C1C}">
                 <a14:useLocalDpi xmlns:a14="http://schemas.microsoft.com/office/drawing/2010/main" val="0"/>
@@ -3464,13 +3427,13 @@
           <p:nvPr/>
         </p:nvPicPr>
         <p:blipFill>
-          <a:blip r:embed="rId3">
+          <a:blip r:embed="rId5">
             <a:extLst>
               <a:ext uri="{28A0092B-C50C-407E-A947-70E740481C1C}">
                 <a14:useLocalDpi xmlns:a14="http://schemas.microsoft.com/office/drawing/2010/main" val="0"/>
               </a:ext>
               <a:ext uri="{96DAC541-7B7A-43D3-8B79-37D633B846F1}">
-                <asvg:svgBlip xmlns:asvg="http://schemas.microsoft.com/office/drawing/2016/SVG/main" r:embed="rId4"/>
+                <asvg:svgBlip xmlns:asvg="http://schemas.microsoft.com/office/drawing/2016/SVG/main" r:embed="rId6"/>
               </a:ext>
             </a:extLst>
           </a:blip>
@@ -3480,7 +3443,7 @@
         </p:blipFill>
         <p:spPr>
           <a:xfrm>
-            <a:off x="1676400" y="4562475"/>
+            <a:off x="2060430" y="190500"/>
             <a:ext cx="1676400" cy="1676400"/>
           </a:xfrm>
           <a:prstGeom prst="rect">
@@ -3503,13 +3466,13 @@
           <p:nvPr/>
         </p:nvPicPr>
         <p:blipFill>
-          <a:blip r:embed="rId5">
+          <a:blip r:embed="rId7">
             <a:extLst>
               <a:ext uri="{28A0092B-C50C-407E-A947-70E740481C1C}">
                 <a14:useLocalDpi xmlns:a14="http://schemas.microsoft.com/office/drawing/2010/main" val="0"/>
               </a:ext>
               <a:ext uri="{96DAC541-7B7A-43D3-8B79-37D633B846F1}">
-                <asvg:svgBlip xmlns:asvg="http://schemas.microsoft.com/office/drawing/2016/SVG/main" r:embed="rId6"/>
+                <asvg:svgBlip xmlns:asvg="http://schemas.microsoft.com/office/drawing/2016/SVG/main" r:embed="rId8"/>
               </a:ext>
             </a:extLst>
           </a:blip>
@@ -3542,13 +3505,13 @@
           <p:nvPr/>
         </p:nvPicPr>
         <p:blipFill>
-          <a:blip r:embed="rId7">
+          <a:blip r:embed="rId9">
             <a:extLst>
               <a:ext uri="{28A0092B-C50C-407E-A947-70E740481C1C}">
                 <a14:useLocalDpi xmlns:a14="http://schemas.microsoft.com/office/drawing/2010/main" val="0"/>
               </a:ext>
               <a:ext uri="{96DAC541-7B7A-43D3-8B79-37D633B846F1}">
-                <asvg:svgBlip xmlns:asvg="http://schemas.microsoft.com/office/drawing/2016/SVG/main" r:embed="rId8"/>
+                <asvg:svgBlip xmlns:asvg="http://schemas.microsoft.com/office/drawing/2016/SVG/main" r:embed="rId10"/>
               </a:ext>
             </a:extLst>
           </a:blip>
@@ -3581,13 +3544,13 @@
           <p:nvPr/>
         </p:nvPicPr>
         <p:blipFill>
-          <a:blip r:embed="rId9">
+          <a:blip r:embed="rId11">
             <a:extLst>
               <a:ext uri="{28A0092B-C50C-407E-A947-70E740481C1C}">
                 <a14:useLocalDpi xmlns:a14="http://schemas.microsoft.com/office/drawing/2010/main" val="0"/>
               </a:ext>
               <a:ext uri="{96DAC541-7B7A-43D3-8B79-37D633B846F1}">
-                <asvg:svgBlip xmlns:asvg="http://schemas.microsoft.com/office/drawing/2016/SVG/main" r:embed="rId10"/>
+                <asvg:svgBlip xmlns:asvg="http://schemas.microsoft.com/office/drawing/2016/SVG/main" r:embed="rId12"/>
               </a:ext>
             </a:extLst>
           </a:blip>
@@ -3620,13 +3583,13 @@
           <p:nvPr/>
         </p:nvPicPr>
         <p:blipFill>
-          <a:blip r:embed="rId11">
+          <a:blip r:embed="rId13">
             <a:extLst>
               <a:ext uri="{28A0092B-C50C-407E-A947-70E740481C1C}">
                 <a14:useLocalDpi xmlns:a14="http://schemas.microsoft.com/office/drawing/2010/main" val="0"/>
               </a:ext>
               <a:ext uri="{96DAC541-7B7A-43D3-8B79-37D633B846F1}">
-                <asvg:svgBlip xmlns:asvg="http://schemas.microsoft.com/office/drawing/2016/SVG/main" r:embed="rId12"/>
+                <asvg:svgBlip xmlns:asvg="http://schemas.microsoft.com/office/drawing/2016/SVG/main" r:embed="rId14"/>
               </a:ext>
             </a:extLst>
           </a:blip>
@@ -3659,13 +3622,13 @@
           <p:nvPr/>
         </p:nvPicPr>
         <p:blipFill>
-          <a:blip r:embed="rId13">
+          <a:blip r:embed="rId15">
             <a:extLst>
               <a:ext uri="{28A0092B-C50C-407E-A947-70E740481C1C}">
                 <a14:useLocalDpi xmlns:a14="http://schemas.microsoft.com/office/drawing/2010/main" val="0"/>
               </a:ext>
               <a:ext uri="{96DAC541-7B7A-43D3-8B79-37D633B846F1}">
-                <asvg:svgBlip xmlns:asvg="http://schemas.microsoft.com/office/drawing/2016/SVG/main" r:embed="rId14"/>
+                <asvg:svgBlip xmlns:asvg="http://schemas.microsoft.com/office/drawing/2016/SVG/main" r:embed="rId16"/>
               </a:ext>
             </a:extLst>
           </a:blip>
@@ -3698,13 +3661,13 @@
           <p:nvPr/>
         </p:nvPicPr>
         <p:blipFill>
-          <a:blip r:embed="rId15">
+          <a:blip r:embed="rId17">
             <a:extLst>
               <a:ext uri="{28A0092B-C50C-407E-A947-70E740481C1C}">
                 <a14:useLocalDpi xmlns:a14="http://schemas.microsoft.com/office/drawing/2010/main" val="0"/>
               </a:ext>
               <a:ext uri="{96DAC541-7B7A-43D3-8B79-37D633B846F1}">
-                <asvg:svgBlip xmlns:asvg="http://schemas.microsoft.com/office/drawing/2016/SVG/main" r:embed="rId16"/>
+                <asvg:svgBlip xmlns:asvg="http://schemas.microsoft.com/office/drawing/2016/SVG/main" r:embed="rId18"/>
               </a:ext>
             </a:extLst>
           </a:blip>
@@ -3716,6 +3679,183 @@
           <a:xfrm>
             <a:off x="4567218" y="433350"/>
             <a:ext cx="1673352" cy="1673352"/>
+          </a:xfrm>
+          <a:prstGeom prst="rect">
+            <a:avLst/>
+          </a:prstGeom>
+        </p:spPr>
+      </p:pic>
+      <p:grpSp>
+        <p:nvGrpSpPr>
+          <p:cNvPr id="19" name="Group 18">
+            <a:extLst>
+              <a:ext uri="{FF2B5EF4-FFF2-40B4-BE49-F238E27FC236}">
+                <a16:creationId xmlns:a16="http://schemas.microsoft.com/office/drawing/2014/main" id="{B3801AA3-A9E7-F58F-CBFE-8737A525147A}"/>
+              </a:ext>
+            </a:extLst>
+          </p:cNvPr>
+          <p:cNvGrpSpPr/>
+          <p:nvPr/>
+        </p:nvGrpSpPr>
+        <p:grpSpPr>
+          <a:xfrm>
+            <a:off x="4567218" y="3991822"/>
+            <a:ext cx="1673352" cy="2075602"/>
+            <a:chOff x="4567218" y="3991822"/>
+            <a:chExt cx="1673352" cy="2075602"/>
+          </a:xfrm>
+        </p:grpSpPr>
+        <p:pic>
+          <p:nvPicPr>
+            <p:cNvPr id="6" name="Graphic 5" descr="Clock with solid fill">
+              <a:extLst>
+                <a:ext uri="{FF2B5EF4-FFF2-40B4-BE49-F238E27FC236}">
+                  <a16:creationId xmlns:a16="http://schemas.microsoft.com/office/drawing/2014/main" id="{97C54578-5E8B-0178-40FF-F479EFD34EFC}"/>
+                </a:ext>
+              </a:extLst>
+            </p:cNvPr>
+            <p:cNvPicPr>
+              <a:picLocks noChangeAspect="1"/>
+            </p:cNvPicPr>
+            <p:nvPr/>
+          </p:nvPicPr>
+          <p:blipFill>
+            <a:blip r:embed="rId19">
+              <a:extLst>
+                <a:ext uri="{28A0092B-C50C-407E-A947-70E740481C1C}">
+                  <a14:useLocalDpi xmlns:a14="http://schemas.microsoft.com/office/drawing/2010/main" val="0"/>
+                </a:ext>
+                <a:ext uri="{96DAC541-7B7A-43D3-8B79-37D633B846F1}">
+                  <asvg:svgBlip xmlns:asvg="http://schemas.microsoft.com/office/drawing/2016/SVG/main" r:embed="rId20"/>
+                </a:ext>
+              </a:extLst>
+            </a:blip>
+            <a:stretch>
+              <a:fillRect/>
+            </a:stretch>
+          </p:blipFill>
+          <p:spPr>
+            <a:xfrm>
+              <a:off x="5010979" y="3991822"/>
+              <a:ext cx="914400" cy="914400"/>
+            </a:xfrm>
+            <a:prstGeom prst="rect">
+              <a:avLst/>
+            </a:prstGeom>
+          </p:spPr>
+        </p:pic>
+        <p:pic>
+          <p:nvPicPr>
+            <p:cNvPr id="14" name="Graphic 13" descr="Folder Search with solid fill">
+              <a:extLst>
+                <a:ext uri="{FF2B5EF4-FFF2-40B4-BE49-F238E27FC236}">
+                  <a16:creationId xmlns:a16="http://schemas.microsoft.com/office/drawing/2014/main" id="{7FD36521-C727-75B5-A800-54867BCEC62C}"/>
+                </a:ext>
+              </a:extLst>
+            </p:cNvPr>
+            <p:cNvPicPr>
+              <a:picLocks noChangeAspect="1"/>
+            </p:cNvPicPr>
+            <p:nvPr/>
+          </p:nvPicPr>
+          <p:blipFill>
+            <a:blip r:embed="rId21">
+              <a:extLst>
+                <a:ext uri="{28A0092B-C50C-407E-A947-70E740481C1C}">
+                  <a14:useLocalDpi xmlns:a14="http://schemas.microsoft.com/office/drawing/2010/main" val="0"/>
+                </a:ext>
+                <a:ext uri="{96DAC541-7B7A-43D3-8B79-37D633B846F1}">
+                  <asvg:svgBlip xmlns:asvg="http://schemas.microsoft.com/office/drawing/2016/SVG/main" r:embed="rId22"/>
+                </a:ext>
+              </a:extLst>
+            </a:blip>
+            <a:stretch>
+              <a:fillRect/>
+            </a:stretch>
+          </p:blipFill>
+          <p:spPr>
+            <a:xfrm>
+              <a:off x="4567218" y="4394072"/>
+              <a:ext cx="1673352" cy="1673352"/>
+            </a:xfrm>
+            <a:prstGeom prst="rect">
+              <a:avLst/>
+            </a:prstGeom>
+          </p:spPr>
+        </p:pic>
+      </p:grpSp>
+      <p:pic>
+        <p:nvPicPr>
+          <p:cNvPr id="3" name="Graphic 2" descr="Clock outline">
+            <a:extLst>
+              <a:ext uri="{FF2B5EF4-FFF2-40B4-BE49-F238E27FC236}">
+                <a16:creationId xmlns:a16="http://schemas.microsoft.com/office/drawing/2014/main" id="{0BEEB3D8-01DA-059E-4B1A-A7C30FCE2D3A}"/>
+              </a:ext>
+            </a:extLst>
+          </p:cNvPr>
+          <p:cNvPicPr>
+            <a:picLocks noChangeAspect="1"/>
+          </p:cNvPicPr>
+          <p:nvPr/>
+        </p:nvPicPr>
+        <p:blipFill>
+          <a:blip r:embed="rId23">
+            <a:extLst>
+              <a:ext uri="{28A0092B-C50C-407E-A947-70E740481C1C}">
+                <a14:useLocalDpi xmlns:a14="http://schemas.microsoft.com/office/drawing/2010/main" val="0"/>
+              </a:ext>
+              <a:ext uri="{96DAC541-7B7A-43D3-8B79-37D633B846F1}">
+                <asvg:svgBlip xmlns:asvg="http://schemas.microsoft.com/office/drawing/2016/SVG/main" r:embed="rId24"/>
+              </a:ext>
+            </a:extLst>
+          </a:blip>
+          <a:stretch>
+            <a:fillRect/>
+          </a:stretch>
+        </p:blipFill>
+        <p:spPr>
+          <a:xfrm>
+            <a:off x="3013366" y="4972049"/>
+            <a:ext cx="914400" cy="914400"/>
+          </a:xfrm>
+          <a:prstGeom prst="rect">
+            <a:avLst/>
+          </a:prstGeom>
+        </p:spPr>
+      </p:pic>
+      <p:pic>
+        <p:nvPicPr>
+          <p:cNvPr id="18" name="Graphic 17" descr="Clock outline">
+            <a:extLst>
+              <a:ext uri="{FF2B5EF4-FFF2-40B4-BE49-F238E27FC236}">
+                <a16:creationId xmlns:a16="http://schemas.microsoft.com/office/drawing/2014/main" id="{D9C009BB-0F7D-B50E-9D05-E674F2ABFE08}"/>
+              </a:ext>
+            </a:extLst>
+          </p:cNvPr>
+          <p:cNvPicPr>
+            <a:picLocks noChangeAspect="1"/>
+          </p:cNvPicPr>
+          <p:nvPr/>
+        </p:nvPicPr>
+        <p:blipFill>
+          <a:blip r:embed="rId25">
+            <a:extLst>
+              <a:ext uri="{28A0092B-C50C-407E-A947-70E740481C1C}">
+                <a14:useLocalDpi xmlns:a14="http://schemas.microsoft.com/office/drawing/2010/main" val="0"/>
+              </a:ext>
+              <a:ext uri="{96DAC541-7B7A-43D3-8B79-37D633B846F1}">
+                <asvg:svgBlip xmlns:asvg="http://schemas.microsoft.com/office/drawing/2016/SVG/main" r:embed="rId26"/>
+              </a:ext>
+            </a:extLst>
+          </a:blip>
+          <a:stretch>
+            <a:fillRect/>
+          </a:stretch>
+        </p:blipFill>
+        <p:spPr>
+          <a:xfrm>
+            <a:off x="2557201" y="4429972"/>
+            <a:ext cx="509848" cy="509848"/>
           </a:xfrm>
           <a:prstGeom prst="rect">
             <a:avLst/>

</xml_diff>

<commit_message>
Added Home Page Content
</commit_message>
<xml_diff>
--- a/Event Organizer App/app_images/App_Images.pptx
+++ b/Event Organizer App/app_images/App_Images.pptx
@@ -6,6 +6,12 @@
   </p:sldMasterIdLst>
   <p:sldIdLst>
     <p:sldId id="257" r:id="rId2"/>
+    <p:sldId id="258" r:id="rId3"/>
+    <p:sldId id="261" r:id="rId4"/>
+    <p:sldId id="262" r:id="rId5"/>
+    <p:sldId id="263" r:id="rId6"/>
+    <p:sldId id="259" r:id="rId7"/>
+    <p:sldId id="260" r:id="rId8"/>
   </p:sldIdLst>
   <p:sldSz cx="12192000" cy="6858000"/>
   <p:notesSz cx="6858000" cy="9144000"/>
@@ -259,7 +265,7 @@
           <a:p>
             <a:fld id="{F2CF84AC-730A-472F-B1D8-F72CDD076E52}" type="datetimeFigureOut">
               <a:rPr lang="en-US" smtClean="0"/>
-              <a:t>1/21/2024</a:t>
+              <a:t>1/22/2024</a:t>
             </a:fld>
             <a:endParaRPr lang="en-US"/>
           </a:p>
@@ -457,7 +463,7 @@
           <a:p>
             <a:fld id="{F2CF84AC-730A-472F-B1D8-F72CDD076E52}" type="datetimeFigureOut">
               <a:rPr lang="en-US" smtClean="0"/>
-              <a:t>1/21/2024</a:t>
+              <a:t>1/22/2024</a:t>
             </a:fld>
             <a:endParaRPr lang="en-US"/>
           </a:p>
@@ -665,7 +671,7 @@
           <a:p>
             <a:fld id="{F2CF84AC-730A-472F-B1D8-F72CDD076E52}" type="datetimeFigureOut">
               <a:rPr lang="en-US" smtClean="0"/>
-              <a:t>1/21/2024</a:t>
+              <a:t>1/22/2024</a:t>
             </a:fld>
             <a:endParaRPr lang="en-US"/>
           </a:p>
@@ -863,7 +869,7 @@
           <a:p>
             <a:fld id="{F2CF84AC-730A-472F-B1D8-F72CDD076E52}" type="datetimeFigureOut">
               <a:rPr lang="en-US" smtClean="0"/>
-              <a:t>1/21/2024</a:t>
+              <a:t>1/22/2024</a:t>
             </a:fld>
             <a:endParaRPr lang="en-US"/>
           </a:p>
@@ -1138,7 +1144,7 @@
           <a:p>
             <a:fld id="{F2CF84AC-730A-472F-B1D8-F72CDD076E52}" type="datetimeFigureOut">
               <a:rPr lang="en-US" smtClean="0"/>
-              <a:t>1/21/2024</a:t>
+              <a:t>1/22/2024</a:t>
             </a:fld>
             <a:endParaRPr lang="en-US"/>
           </a:p>
@@ -1403,7 +1409,7 @@
           <a:p>
             <a:fld id="{F2CF84AC-730A-472F-B1D8-F72CDD076E52}" type="datetimeFigureOut">
               <a:rPr lang="en-US" smtClean="0"/>
-              <a:t>1/21/2024</a:t>
+              <a:t>1/22/2024</a:t>
             </a:fld>
             <a:endParaRPr lang="en-US"/>
           </a:p>
@@ -1815,7 +1821,7 @@
           <a:p>
             <a:fld id="{F2CF84AC-730A-472F-B1D8-F72CDD076E52}" type="datetimeFigureOut">
               <a:rPr lang="en-US" smtClean="0"/>
-              <a:t>1/21/2024</a:t>
+              <a:t>1/22/2024</a:t>
             </a:fld>
             <a:endParaRPr lang="en-US"/>
           </a:p>
@@ -1956,7 +1962,7 @@
           <a:p>
             <a:fld id="{F2CF84AC-730A-472F-B1D8-F72CDD076E52}" type="datetimeFigureOut">
               <a:rPr lang="en-US" smtClean="0"/>
-              <a:t>1/21/2024</a:t>
+              <a:t>1/22/2024</a:t>
             </a:fld>
             <a:endParaRPr lang="en-US"/>
           </a:p>
@@ -2069,7 +2075,7 @@
           <a:p>
             <a:fld id="{F2CF84AC-730A-472F-B1D8-F72CDD076E52}" type="datetimeFigureOut">
               <a:rPr lang="en-US" smtClean="0"/>
-              <a:t>1/21/2024</a:t>
+              <a:t>1/22/2024</a:t>
             </a:fld>
             <a:endParaRPr lang="en-US"/>
           </a:p>
@@ -2380,7 +2386,7 @@
           <a:p>
             <a:fld id="{F2CF84AC-730A-472F-B1D8-F72CDD076E52}" type="datetimeFigureOut">
               <a:rPr lang="en-US" smtClean="0"/>
-              <a:t>1/21/2024</a:t>
+              <a:t>1/22/2024</a:t>
             </a:fld>
             <a:endParaRPr lang="en-US"/>
           </a:p>
@@ -2668,7 +2674,7 @@
           <a:p>
             <a:fld id="{F2CF84AC-730A-472F-B1D8-F72CDD076E52}" type="datetimeFigureOut">
               <a:rPr lang="en-US" smtClean="0"/>
-              <a:t>1/21/2024</a:t>
+              <a:t>1/22/2024</a:t>
             </a:fld>
             <a:endParaRPr lang="en-US"/>
           </a:p>
@@ -2909,7 +2915,7 @@
           <a:p>
             <a:fld id="{F2CF84AC-730A-472F-B1D8-F72CDD076E52}" type="datetimeFigureOut">
               <a:rPr lang="en-US" smtClean="0"/>
-              <a:t>1/21/2024</a:t>
+              <a:t>1/22/2024</a:t>
             </a:fld>
             <a:endParaRPr lang="en-US"/>
           </a:p>
@@ -3875,6 +3881,1659 @@
 </p:sld>
 </file>
 
+<file path=ppt/slides/slide2.xml><?xml version="1.0" encoding="utf-8"?>
+<p:sld xmlns:a="http://schemas.openxmlformats.org/drawingml/2006/main" xmlns:r="http://schemas.openxmlformats.org/officeDocument/2006/relationships" xmlns:p="http://schemas.openxmlformats.org/presentationml/2006/main">
+  <p:cSld>
+    <p:spTree>
+      <p:nvGrpSpPr>
+        <p:cNvPr id="1" name=""/>
+        <p:cNvGrpSpPr/>
+        <p:nvPr/>
+      </p:nvGrpSpPr>
+      <p:grpSpPr>
+        <a:xfrm>
+          <a:off x="0" y="0"/>
+          <a:ext cx="0" cy="0"/>
+          <a:chOff x="0" y="0"/>
+          <a:chExt cx="0" cy="0"/>
+        </a:xfrm>
+      </p:grpSpPr>
+      <p:pic>
+        <p:nvPicPr>
+          <p:cNvPr id="3" name="Graphic 2" descr="Home with solid fill">
+            <a:extLst>
+              <a:ext uri="{FF2B5EF4-FFF2-40B4-BE49-F238E27FC236}">
+                <a16:creationId xmlns:a16="http://schemas.microsoft.com/office/drawing/2014/main" id="{137017A6-C2F2-5B62-5258-21B059ABBF8A}"/>
+              </a:ext>
+            </a:extLst>
+          </p:cNvPr>
+          <p:cNvPicPr>
+            <a:picLocks noChangeAspect="1"/>
+          </p:cNvPicPr>
+          <p:nvPr/>
+        </p:nvPicPr>
+        <p:blipFill>
+          <a:blip r:embed="rId2">
+            <a:extLst>
+              <a:ext uri="{28A0092B-C50C-407E-A947-70E740481C1C}">
+                <a14:useLocalDpi xmlns:a14="http://schemas.microsoft.com/office/drawing/2010/main" val="0"/>
+              </a:ext>
+              <a:ext uri="{96DAC541-7B7A-43D3-8B79-37D633B846F1}">
+                <asvg:svgBlip xmlns:asvg="http://schemas.microsoft.com/office/drawing/2016/SVG/main" r:embed="rId3"/>
+              </a:ext>
+            </a:extLst>
+          </a:blip>
+          <a:stretch>
+            <a:fillRect/>
+          </a:stretch>
+        </p:blipFill>
+        <p:spPr>
+          <a:xfrm>
+            <a:off x="1519782" y="1041813"/>
+            <a:ext cx="3657600" cy="3657600"/>
+          </a:xfrm>
+          <a:prstGeom prst="rect">
+            <a:avLst/>
+          </a:prstGeom>
+        </p:spPr>
+      </p:pic>
+      <p:grpSp>
+        <p:nvGrpSpPr>
+          <p:cNvPr id="53" name="Group 52">
+            <a:extLst>
+              <a:ext uri="{FF2B5EF4-FFF2-40B4-BE49-F238E27FC236}">
+                <a16:creationId xmlns:a16="http://schemas.microsoft.com/office/drawing/2014/main" id="{F175F377-B460-307F-5CD7-A02F34F928F6}"/>
+              </a:ext>
+            </a:extLst>
+          </p:cNvPr>
+          <p:cNvGrpSpPr/>
+          <p:nvPr/>
+        </p:nvGrpSpPr>
+        <p:grpSpPr>
+          <a:xfrm>
+            <a:off x="5909271" y="1041813"/>
+            <a:ext cx="3657600" cy="3657598"/>
+            <a:chOff x="2648043" y="1679452"/>
+            <a:chExt cx="6249050" cy="4811697"/>
+          </a:xfrm>
+        </p:grpSpPr>
+        <p:pic>
+          <p:nvPicPr>
+            <p:cNvPr id="54" name="Graphic 53" descr="Dance with solid fill">
+              <a:extLst>
+                <a:ext uri="{FF2B5EF4-FFF2-40B4-BE49-F238E27FC236}">
+                  <a16:creationId xmlns:a16="http://schemas.microsoft.com/office/drawing/2014/main" id="{72000389-E5CE-08F2-2151-D893BF7F373B}"/>
+                </a:ext>
+              </a:extLst>
+            </p:cNvPr>
+            <p:cNvPicPr>
+              <a:picLocks noChangeAspect="1"/>
+            </p:cNvPicPr>
+            <p:nvPr/>
+          </p:nvPicPr>
+          <p:blipFill>
+            <a:blip r:embed="rId4">
+              <a:extLst>
+                <a:ext uri="{28A0092B-C50C-407E-A947-70E740481C1C}">
+                  <a14:useLocalDpi xmlns:a14="http://schemas.microsoft.com/office/drawing/2010/main" val="0"/>
+                </a:ext>
+                <a:ext uri="{96DAC541-7B7A-43D3-8B79-37D633B846F1}">
+                  <asvg:svgBlip xmlns:asvg="http://schemas.microsoft.com/office/drawing/2016/SVG/main" r:embed="rId5"/>
+                </a:ext>
+              </a:extLst>
+            </a:blip>
+            <a:stretch>
+              <a:fillRect/>
+            </a:stretch>
+          </p:blipFill>
+          <p:spPr>
+            <a:xfrm>
+              <a:off x="4439392" y="3234074"/>
+              <a:ext cx="2743201" cy="2743200"/>
+            </a:xfrm>
+            <a:prstGeom prst="rect">
+              <a:avLst/>
+            </a:prstGeom>
+          </p:spPr>
+        </p:pic>
+        <p:pic>
+          <p:nvPicPr>
+            <p:cNvPr id="55" name="Graphic 54" descr="Speakers with solid fill">
+              <a:extLst>
+                <a:ext uri="{FF2B5EF4-FFF2-40B4-BE49-F238E27FC236}">
+                  <a16:creationId xmlns:a16="http://schemas.microsoft.com/office/drawing/2014/main" id="{5254DC1B-A14C-9F0B-63B4-00A02204F8EC}"/>
+                </a:ext>
+              </a:extLst>
+            </p:cNvPr>
+            <p:cNvPicPr>
+              <a:picLocks noChangeAspect="1"/>
+            </p:cNvPicPr>
+            <p:nvPr/>
+          </p:nvPicPr>
+          <p:blipFill rotWithShape="1">
+            <a:blip r:embed="rId6">
+              <a:extLst>
+                <a:ext uri="{28A0092B-C50C-407E-A947-70E740481C1C}">
+                  <a14:useLocalDpi xmlns:a14="http://schemas.microsoft.com/office/drawing/2010/main" val="0"/>
+                </a:ext>
+                <a:ext uri="{96DAC541-7B7A-43D3-8B79-37D633B846F1}">
+                  <asvg:svgBlip xmlns:asvg="http://schemas.microsoft.com/office/drawing/2016/SVG/main" r:embed="rId7"/>
+                </a:ext>
+              </a:extLst>
+            </a:blip>
+            <a:srcRect l="-17057" r="-1" b="14483"/>
+            <a:stretch/>
+          </p:blipFill>
+          <p:spPr>
+            <a:xfrm>
+              <a:off x="2648043" y="4425047"/>
+              <a:ext cx="2140739" cy="1563926"/>
+            </a:xfrm>
+            <a:prstGeom prst="rect">
+              <a:avLst/>
+            </a:prstGeom>
+          </p:spPr>
+        </p:pic>
+        <p:pic>
+          <p:nvPicPr>
+            <p:cNvPr id="56" name="Graphic 55" descr="Fireworks with solid fill">
+              <a:extLst>
+                <a:ext uri="{FF2B5EF4-FFF2-40B4-BE49-F238E27FC236}">
+                  <a16:creationId xmlns:a16="http://schemas.microsoft.com/office/drawing/2014/main" id="{F29B1EDF-D3BE-7865-32BC-23FA4A8B1BF1}"/>
+                </a:ext>
+              </a:extLst>
+            </p:cNvPr>
+            <p:cNvPicPr>
+              <a:picLocks noChangeAspect="1"/>
+            </p:cNvPicPr>
+            <p:nvPr/>
+          </p:nvPicPr>
+          <p:blipFill rotWithShape="1">
+            <a:blip r:embed="rId8">
+              <a:extLst>
+                <a:ext uri="{28A0092B-C50C-407E-A947-70E740481C1C}">
+                  <a14:useLocalDpi xmlns:a14="http://schemas.microsoft.com/office/drawing/2010/main" val="0"/>
+                </a:ext>
+                <a:ext uri="{96DAC541-7B7A-43D3-8B79-37D633B846F1}">
+                  <asvg:svgBlip xmlns:asvg="http://schemas.microsoft.com/office/drawing/2016/SVG/main" r:embed="rId9"/>
+                </a:ext>
+              </a:extLst>
+            </a:blip>
+            <a:srcRect t="-46140" b="-1"/>
+            <a:stretch/>
+          </p:blipFill>
+          <p:spPr>
+            <a:xfrm>
+              <a:off x="4310810" y="1679452"/>
+              <a:ext cx="3017042" cy="1839859"/>
+            </a:xfrm>
+            <a:prstGeom prst="rect">
+              <a:avLst/>
+            </a:prstGeom>
+          </p:spPr>
+        </p:pic>
+        <p:pic>
+          <p:nvPicPr>
+            <p:cNvPr id="57" name="Graphic 56" descr="Speakers with solid fill">
+              <a:extLst>
+                <a:ext uri="{FF2B5EF4-FFF2-40B4-BE49-F238E27FC236}">
+                  <a16:creationId xmlns:a16="http://schemas.microsoft.com/office/drawing/2014/main" id="{B0CB624A-46E8-95AD-FB07-B73480625C6B}"/>
+                </a:ext>
+              </a:extLst>
+            </p:cNvPr>
+            <p:cNvPicPr>
+              <a:picLocks noChangeAspect="1"/>
+            </p:cNvPicPr>
+            <p:nvPr/>
+          </p:nvPicPr>
+          <p:blipFill rotWithShape="1">
+            <a:blip r:embed="rId6">
+              <a:extLst>
+                <a:ext uri="{28A0092B-C50C-407E-A947-70E740481C1C}">
+                  <a14:useLocalDpi xmlns:a14="http://schemas.microsoft.com/office/drawing/2010/main" val="0"/>
+                </a:ext>
+                <a:ext uri="{96DAC541-7B7A-43D3-8B79-37D633B846F1}">
+                  <asvg:svgBlip xmlns:asvg="http://schemas.microsoft.com/office/drawing/2016/SVG/main" r:embed="rId7"/>
+                </a:ext>
+              </a:extLst>
+            </a:blip>
+            <a:srcRect l="-1" r="-19216" b="-12976"/>
+            <a:stretch/>
+          </p:blipFill>
+          <p:spPr>
+            <a:xfrm>
+              <a:off x="6716867" y="4425047"/>
+              <a:ext cx="2180226" cy="2066102"/>
+            </a:xfrm>
+            <a:prstGeom prst="rect">
+              <a:avLst/>
+            </a:prstGeom>
+          </p:spPr>
+        </p:pic>
+        <p:pic>
+          <p:nvPicPr>
+            <p:cNvPr id="58" name="Graphic 57" descr="Music notation with solid fill">
+              <a:extLst>
+                <a:ext uri="{FF2B5EF4-FFF2-40B4-BE49-F238E27FC236}">
+                  <a16:creationId xmlns:a16="http://schemas.microsoft.com/office/drawing/2014/main" id="{27D73906-2FDF-F3DE-AF35-00CCABD28147}"/>
+                </a:ext>
+              </a:extLst>
+            </p:cNvPr>
+            <p:cNvPicPr>
+              <a:picLocks noChangeAspect="1"/>
+            </p:cNvPicPr>
+            <p:nvPr/>
+          </p:nvPicPr>
+          <p:blipFill rotWithShape="1">
+            <a:blip r:embed="rId10">
+              <a:extLst>
+                <a:ext uri="{28A0092B-C50C-407E-A947-70E740481C1C}">
+                  <a14:useLocalDpi xmlns:a14="http://schemas.microsoft.com/office/drawing/2010/main" val="0"/>
+                </a:ext>
+                <a:ext uri="{96DAC541-7B7A-43D3-8B79-37D633B846F1}">
+                  <asvg:svgBlip xmlns:asvg="http://schemas.microsoft.com/office/drawing/2016/SVG/main" r:embed="rId11"/>
+                </a:ext>
+              </a:extLst>
+            </a:blip>
+            <a:srcRect l="-4561" r="-1"/>
+            <a:stretch/>
+          </p:blipFill>
+          <p:spPr>
+            <a:xfrm>
+              <a:off x="3126019" y="3602497"/>
+              <a:ext cx="1434166" cy="1371600"/>
+            </a:xfrm>
+            <a:prstGeom prst="rect">
+              <a:avLst/>
+            </a:prstGeom>
+          </p:spPr>
+        </p:pic>
+        <p:pic>
+          <p:nvPicPr>
+            <p:cNvPr id="59" name="Graphic 58" descr="Music notation with solid fill">
+              <a:extLst>
+                <a:ext uri="{FF2B5EF4-FFF2-40B4-BE49-F238E27FC236}">
+                  <a16:creationId xmlns:a16="http://schemas.microsoft.com/office/drawing/2014/main" id="{DE7053BA-4D3B-930D-F4EA-5233BDFDCD18}"/>
+                </a:ext>
+              </a:extLst>
+            </p:cNvPr>
+            <p:cNvPicPr>
+              <a:picLocks noChangeAspect="1"/>
+            </p:cNvPicPr>
+            <p:nvPr/>
+          </p:nvPicPr>
+          <p:blipFill rotWithShape="1">
+            <a:blip r:embed="rId10">
+              <a:extLst>
+                <a:ext uri="{28A0092B-C50C-407E-A947-70E740481C1C}">
+                  <a14:useLocalDpi xmlns:a14="http://schemas.microsoft.com/office/drawing/2010/main" val="0"/>
+                </a:ext>
+                <a:ext uri="{96DAC541-7B7A-43D3-8B79-37D633B846F1}">
+                  <asvg:svgBlip xmlns:asvg="http://schemas.microsoft.com/office/drawing/2016/SVG/main" r:embed="rId11"/>
+                </a:ext>
+              </a:extLst>
+            </a:blip>
+            <a:srcRect l="1" r="-22744"/>
+            <a:stretch/>
+          </p:blipFill>
+          <p:spPr>
+            <a:xfrm>
+              <a:off x="6945466" y="3602497"/>
+              <a:ext cx="1683543" cy="1371601"/>
+            </a:xfrm>
+            <a:prstGeom prst="rect">
+              <a:avLst/>
+            </a:prstGeom>
+          </p:spPr>
+        </p:pic>
+      </p:grpSp>
+    </p:spTree>
+    <p:extLst>
+      <p:ext uri="{BB962C8B-B14F-4D97-AF65-F5344CB8AC3E}">
+        <p14:creationId xmlns:p14="http://schemas.microsoft.com/office/powerpoint/2010/main" val="391486891"/>
+      </p:ext>
+    </p:extLst>
+  </p:cSld>
+  <p:clrMapOvr>
+    <a:masterClrMapping/>
+  </p:clrMapOvr>
+</p:sld>
+</file>
+
+<file path=ppt/slides/slide3.xml><?xml version="1.0" encoding="utf-8"?>
+<p:sld xmlns:a="http://schemas.openxmlformats.org/drawingml/2006/main" xmlns:r="http://schemas.openxmlformats.org/officeDocument/2006/relationships" xmlns:p="http://schemas.openxmlformats.org/presentationml/2006/main">
+  <p:cSld>
+    <p:spTree>
+      <p:nvGrpSpPr>
+        <p:cNvPr id="1" name=""/>
+        <p:cNvGrpSpPr/>
+        <p:nvPr/>
+      </p:nvGrpSpPr>
+      <p:grpSpPr>
+        <a:xfrm>
+          <a:off x="0" y="0"/>
+          <a:ext cx="0" cy="0"/>
+          <a:chOff x="0" y="0"/>
+          <a:chExt cx="0" cy="0"/>
+        </a:xfrm>
+      </p:grpSpPr>
+      <p:pic>
+        <p:nvPicPr>
+          <p:cNvPr id="8" name="Graphic 7" descr="Daily calendar with solid fill">
+            <a:extLst>
+              <a:ext uri="{FF2B5EF4-FFF2-40B4-BE49-F238E27FC236}">
+                <a16:creationId xmlns:a16="http://schemas.microsoft.com/office/drawing/2014/main" id="{57E2F4A6-7D9F-D05E-F1F3-4210ACE64DEB}"/>
+              </a:ext>
+            </a:extLst>
+          </p:cNvPr>
+          <p:cNvPicPr>
+            <a:picLocks noChangeAspect="1"/>
+          </p:cNvPicPr>
+          <p:nvPr/>
+        </p:nvPicPr>
+        <p:blipFill rotWithShape="1">
+          <a:blip r:embed="rId2">
+            <a:extLst>
+              <a:ext uri="{28A0092B-C50C-407E-A947-70E740481C1C}">
+                <a14:useLocalDpi xmlns:a14="http://schemas.microsoft.com/office/drawing/2010/main" val="0"/>
+              </a:ext>
+              <a:ext uri="{96DAC541-7B7A-43D3-8B79-37D633B846F1}">
+                <asvg:svgBlip xmlns:asvg="http://schemas.microsoft.com/office/drawing/2016/SVG/main" r:embed="rId3"/>
+              </a:ext>
+            </a:extLst>
+          </a:blip>
+          <a:srcRect t="-2526" b="2526"/>
+          <a:stretch/>
+        </p:blipFill>
+        <p:spPr>
+          <a:xfrm>
+            <a:off x="489528" y="1526309"/>
+            <a:ext cx="3657600" cy="3657600"/>
+          </a:xfrm>
+          <a:prstGeom prst="rect">
+            <a:avLst/>
+          </a:prstGeom>
+        </p:spPr>
+      </p:pic>
+      <p:pic>
+        <p:nvPicPr>
+          <p:cNvPr id="9" name="Graphic 8" descr="Home with solid fill">
+            <a:extLst>
+              <a:ext uri="{FF2B5EF4-FFF2-40B4-BE49-F238E27FC236}">
+                <a16:creationId xmlns:a16="http://schemas.microsoft.com/office/drawing/2014/main" id="{6DAAE2B4-0CE6-AD21-284C-7CB5ED75E052}"/>
+              </a:ext>
+            </a:extLst>
+          </p:cNvPr>
+          <p:cNvPicPr>
+            <a:picLocks noChangeAspect="1"/>
+          </p:cNvPicPr>
+          <p:nvPr/>
+        </p:nvPicPr>
+        <p:blipFill>
+          <a:blip r:embed="rId4">
+            <a:extLst>
+              <a:ext uri="{28A0092B-C50C-407E-A947-70E740481C1C}">
+                <a14:useLocalDpi xmlns:a14="http://schemas.microsoft.com/office/drawing/2010/main" val="0"/>
+              </a:ext>
+              <a:ext uri="{96DAC541-7B7A-43D3-8B79-37D633B846F1}">
+                <asvg:svgBlip xmlns:asvg="http://schemas.microsoft.com/office/drawing/2016/SVG/main" r:embed="rId5"/>
+              </a:ext>
+            </a:extLst>
+          </a:blip>
+          <a:stretch>
+            <a:fillRect/>
+          </a:stretch>
+        </p:blipFill>
+        <p:spPr>
+          <a:xfrm>
+            <a:off x="7195127" y="1766454"/>
+            <a:ext cx="3657600" cy="3657600"/>
+          </a:xfrm>
+          <a:prstGeom prst="rect">
+            <a:avLst/>
+          </a:prstGeom>
+        </p:spPr>
+      </p:pic>
+    </p:spTree>
+    <p:extLst>
+      <p:ext uri="{BB962C8B-B14F-4D97-AF65-F5344CB8AC3E}">
+        <p14:creationId xmlns:p14="http://schemas.microsoft.com/office/powerpoint/2010/main" val="3107405403"/>
+      </p:ext>
+    </p:extLst>
+  </p:cSld>
+  <p:clrMapOvr>
+    <a:masterClrMapping/>
+  </p:clrMapOvr>
+</p:sld>
+</file>
+
+<file path=ppt/slides/slide4.xml><?xml version="1.0" encoding="utf-8"?>
+<p:sld xmlns:a="http://schemas.openxmlformats.org/drawingml/2006/main" xmlns:r="http://schemas.openxmlformats.org/officeDocument/2006/relationships" xmlns:p="http://schemas.openxmlformats.org/presentationml/2006/main">
+  <p:cSld>
+    <p:spTree>
+      <p:nvGrpSpPr>
+        <p:cNvPr id="1" name=""/>
+        <p:cNvGrpSpPr/>
+        <p:nvPr/>
+      </p:nvGrpSpPr>
+      <p:grpSpPr>
+        <a:xfrm>
+          <a:off x="0" y="0"/>
+          <a:ext cx="0" cy="0"/>
+          <a:chOff x="0" y="0"/>
+          <a:chExt cx="0" cy="0"/>
+        </a:xfrm>
+      </p:grpSpPr>
+      <p:pic>
+        <p:nvPicPr>
+          <p:cNvPr id="4" name="Graphic 3" descr="Clipboard Checked with solid fill">
+            <a:extLst>
+              <a:ext uri="{FF2B5EF4-FFF2-40B4-BE49-F238E27FC236}">
+                <a16:creationId xmlns:a16="http://schemas.microsoft.com/office/drawing/2014/main" id="{C4A455A9-3291-C579-78F2-14E8C318881B}"/>
+              </a:ext>
+            </a:extLst>
+          </p:cNvPr>
+          <p:cNvPicPr>
+            <a:picLocks noChangeAspect="1"/>
+          </p:cNvPicPr>
+          <p:nvPr/>
+        </p:nvPicPr>
+        <p:blipFill>
+          <a:blip r:embed="rId2">
+            <a:extLst>
+              <a:ext uri="{28A0092B-C50C-407E-A947-70E740481C1C}">
+                <a14:useLocalDpi xmlns:a14="http://schemas.microsoft.com/office/drawing/2010/main" val="0"/>
+              </a:ext>
+              <a:ext uri="{96DAC541-7B7A-43D3-8B79-37D633B846F1}">
+                <asvg:svgBlip xmlns:asvg="http://schemas.microsoft.com/office/drawing/2016/SVG/main" r:embed="rId3"/>
+              </a:ext>
+            </a:extLst>
+          </a:blip>
+          <a:stretch>
+            <a:fillRect/>
+          </a:stretch>
+        </p:blipFill>
+        <p:spPr>
+          <a:xfrm>
+            <a:off x="1293091" y="1600200"/>
+            <a:ext cx="3657600" cy="3657600"/>
+          </a:xfrm>
+          <a:prstGeom prst="rect">
+            <a:avLst/>
+          </a:prstGeom>
+        </p:spPr>
+      </p:pic>
+      <p:pic>
+        <p:nvPicPr>
+          <p:cNvPr id="9" name="Graphic 8" descr="Home with solid fill">
+            <a:extLst>
+              <a:ext uri="{FF2B5EF4-FFF2-40B4-BE49-F238E27FC236}">
+                <a16:creationId xmlns:a16="http://schemas.microsoft.com/office/drawing/2014/main" id="{6DAAE2B4-0CE6-AD21-284C-7CB5ED75E052}"/>
+              </a:ext>
+            </a:extLst>
+          </p:cNvPr>
+          <p:cNvPicPr>
+            <a:picLocks noChangeAspect="1"/>
+          </p:cNvPicPr>
+          <p:nvPr/>
+        </p:nvPicPr>
+        <p:blipFill>
+          <a:blip r:embed="rId4">
+            <a:extLst>
+              <a:ext uri="{28A0092B-C50C-407E-A947-70E740481C1C}">
+                <a14:useLocalDpi xmlns:a14="http://schemas.microsoft.com/office/drawing/2010/main" val="0"/>
+              </a:ext>
+              <a:ext uri="{96DAC541-7B7A-43D3-8B79-37D633B846F1}">
+                <asvg:svgBlip xmlns:asvg="http://schemas.microsoft.com/office/drawing/2016/SVG/main" r:embed="rId5"/>
+              </a:ext>
+            </a:extLst>
+          </a:blip>
+          <a:stretch>
+            <a:fillRect/>
+          </a:stretch>
+        </p:blipFill>
+        <p:spPr>
+          <a:xfrm>
+            <a:off x="7065818" y="1600200"/>
+            <a:ext cx="3657600" cy="3657600"/>
+          </a:xfrm>
+          <a:prstGeom prst="rect">
+            <a:avLst/>
+          </a:prstGeom>
+        </p:spPr>
+      </p:pic>
+    </p:spTree>
+    <p:extLst>
+      <p:ext uri="{BB962C8B-B14F-4D97-AF65-F5344CB8AC3E}">
+        <p14:creationId xmlns:p14="http://schemas.microsoft.com/office/powerpoint/2010/main" val="1410140564"/>
+      </p:ext>
+    </p:extLst>
+  </p:cSld>
+  <p:clrMapOvr>
+    <a:masterClrMapping/>
+  </p:clrMapOvr>
+</p:sld>
+</file>
+
+<file path=ppt/slides/slide5.xml><?xml version="1.0" encoding="utf-8"?>
+<p:sld xmlns:a="http://schemas.openxmlformats.org/drawingml/2006/main" xmlns:r="http://schemas.openxmlformats.org/officeDocument/2006/relationships" xmlns:p="http://schemas.openxmlformats.org/presentationml/2006/main">
+  <p:cSld>
+    <p:spTree>
+      <p:nvGrpSpPr>
+        <p:cNvPr id="1" name=""/>
+        <p:cNvGrpSpPr/>
+        <p:nvPr/>
+      </p:nvGrpSpPr>
+      <p:grpSpPr>
+        <a:xfrm>
+          <a:off x="0" y="0"/>
+          <a:ext cx="0" cy="0"/>
+          <a:chOff x="0" y="0"/>
+          <a:chExt cx="0" cy="0"/>
+        </a:xfrm>
+      </p:grpSpPr>
+      <p:pic>
+        <p:nvPicPr>
+          <p:cNvPr id="6" name="Graphic 5" descr="Coins with solid fill">
+            <a:extLst>
+              <a:ext uri="{FF2B5EF4-FFF2-40B4-BE49-F238E27FC236}">
+                <a16:creationId xmlns:a16="http://schemas.microsoft.com/office/drawing/2014/main" id="{75A95B8C-74F5-2336-99ED-4FD6BE6AAFD0}"/>
+              </a:ext>
+            </a:extLst>
+          </p:cNvPr>
+          <p:cNvPicPr>
+            <a:picLocks noChangeAspect="1"/>
+          </p:cNvPicPr>
+          <p:nvPr/>
+        </p:nvPicPr>
+        <p:blipFill rotWithShape="1">
+          <a:blip r:embed="rId2">
+            <a:extLst>
+              <a:ext uri="{28A0092B-C50C-407E-A947-70E740481C1C}">
+                <a14:useLocalDpi xmlns:a14="http://schemas.microsoft.com/office/drawing/2010/main" val="0"/>
+              </a:ext>
+              <a:ext uri="{96DAC541-7B7A-43D3-8B79-37D633B846F1}">
+                <asvg:svgBlip xmlns:asvg="http://schemas.microsoft.com/office/drawing/2016/SVG/main" r:embed="rId3"/>
+              </a:ext>
+            </a:extLst>
+          </a:blip>
+          <a:srcRect l="-16667" t="-30809" r="-16667" b="-2524"/>
+          <a:stretch/>
+        </p:blipFill>
+        <p:spPr>
+          <a:xfrm>
+            <a:off x="7139709" y="1286165"/>
+            <a:ext cx="3657600" cy="3657600"/>
+          </a:xfrm>
+          <a:prstGeom prst="rect">
+            <a:avLst/>
+          </a:prstGeom>
+        </p:spPr>
+      </p:pic>
+      <p:pic>
+        <p:nvPicPr>
+          <p:cNvPr id="9" name="Graphic 8" descr="Home with solid fill">
+            <a:extLst>
+              <a:ext uri="{FF2B5EF4-FFF2-40B4-BE49-F238E27FC236}">
+                <a16:creationId xmlns:a16="http://schemas.microsoft.com/office/drawing/2014/main" id="{6DAAE2B4-0CE6-AD21-284C-7CB5ED75E052}"/>
+              </a:ext>
+            </a:extLst>
+          </p:cNvPr>
+          <p:cNvPicPr>
+            <a:picLocks noChangeAspect="1"/>
+          </p:cNvPicPr>
+          <p:nvPr/>
+        </p:nvPicPr>
+        <p:blipFill>
+          <a:blip r:embed="rId4">
+            <a:extLst>
+              <a:ext uri="{28A0092B-C50C-407E-A947-70E740481C1C}">
+                <a14:useLocalDpi xmlns:a14="http://schemas.microsoft.com/office/drawing/2010/main" val="0"/>
+              </a:ext>
+              <a:ext uri="{96DAC541-7B7A-43D3-8B79-37D633B846F1}">
+                <asvg:svgBlip xmlns:asvg="http://schemas.microsoft.com/office/drawing/2016/SVG/main" r:embed="rId5"/>
+              </a:ext>
+            </a:extLst>
+          </a:blip>
+          <a:stretch>
+            <a:fillRect/>
+          </a:stretch>
+        </p:blipFill>
+        <p:spPr>
+          <a:xfrm>
+            <a:off x="849745" y="1870363"/>
+            <a:ext cx="3657600" cy="3657600"/>
+          </a:xfrm>
+          <a:prstGeom prst="rect">
+            <a:avLst/>
+          </a:prstGeom>
+        </p:spPr>
+      </p:pic>
+    </p:spTree>
+    <p:extLst>
+      <p:ext uri="{BB962C8B-B14F-4D97-AF65-F5344CB8AC3E}">
+        <p14:creationId xmlns:p14="http://schemas.microsoft.com/office/powerpoint/2010/main" val="3359844912"/>
+      </p:ext>
+    </p:extLst>
+  </p:cSld>
+  <p:clrMapOvr>
+    <a:masterClrMapping/>
+  </p:clrMapOvr>
+</p:sld>
+</file>
+
+<file path=ppt/slides/slide6.xml><?xml version="1.0" encoding="utf-8"?>
+<p:sld xmlns:a="http://schemas.openxmlformats.org/drawingml/2006/main" xmlns:r="http://schemas.openxmlformats.org/officeDocument/2006/relationships" xmlns:p="http://schemas.openxmlformats.org/presentationml/2006/main">
+  <p:cSld>
+    <p:spTree>
+      <p:nvGrpSpPr>
+        <p:cNvPr id="1" name=""/>
+        <p:cNvGrpSpPr/>
+        <p:nvPr/>
+      </p:nvGrpSpPr>
+      <p:grpSpPr>
+        <a:xfrm>
+          <a:off x="0" y="0"/>
+          <a:ext cx="0" cy="0"/>
+          <a:chOff x="0" y="0"/>
+          <a:chExt cx="0" cy="0"/>
+        </a:xfrm>
+      </p:grpSpPr>
+      <p:grpSp>
+        <p:nvGrpSpPr>
+          <p:cNvPr id="19" name="Group 18">
+            <a:extLst>
+              <a:ext uri="{FF2B5EF4-FFF2-40B4-BE49-F238E27FC236}">
+                <a16:creationId xmlns:a16="http://schemas.microsoft.com/office/drawing/2014/main" id="{74E68AD2-9387-F86B-11A9-15F5191EC642}"/>
+              </a:ext>
+            </a:extLst>
+          </p:cNvPr>
+          <p:cNvGrpSpPr/>
+          <p:nvPr/>
+        </p:nvGrpSpPr>
+        <p:grpSpPr>
+          <a:xfrm>
+            <a:off x="1553252" y="1331100"/>
+            <a:ext cx="3657600" cy="3657600"/>
+            <a:chOff x="2610593" y="1145598"/>
+            <a:chExt cx="6400801" cy="4843377"/>
+          </a:xfrm>
+        </p:grpSpPr>
+        <p:pic>
+          <p:nvPicPr>
+            <p:cNvPr id="20" name="Graphic 19" descr="Dance with solid fill">
+              <a:extLst>
+                <a:ext uri="{FF2B5EF4-FFF2-40B4-BE49-F238E27FC236}">
+                  <a16:creationId xmlns:a16="http://schemas.microsoft.com/office/drawing/2014/main" id="{11B179B3-AB0D-B3FA-B865-68D2AAF76517}"/>
+                </a:ext>
+              </a:extLst>
+            </p:cNvPr>
+            <p:cNvPicPr>
+              <a:picLocks noChangeAspect="1"/>
+            </p:cNvPicPr>
+            <p:nvPr/>
+          </p:nvPicPr>
+          <p:blipFill>
+            <a:blip r:embed="rId2">
+              <a:extLst>
+                <a:ext uri="{28A0092B-C50C-407E-A947-70E740481C1C}">
+                  <a14:useLocalDpi xmlns:a14="http://schemas.microsoft.com/office/drawing/2010/main" val="0"/>
+                </a:ext>
+                <a:ext uri="{96DAC541-7B7A-43D3-8B79-37D633B846F1}">
+                  <asvg:svgBlip xmlns:asvg="http://schemas.microsoft.com/office/drawing/2016/SVG/main" r:embed="rId3"/>
+                </a:ext>
+              </a:extLst>
+            </a:blip>
+            <a:stretch>
+              <a:fillRect/>
+            </a:stretch>
+          </p:blipFill>
+          <p:spPr>
+            <a:xfrm>
+              <a:off x="4439392" y="3234074"/>
+              <a:ext cx="2743201" cy="2743200"/>
+            </a:xfrm>
+            <a:prstGeom prst="rect">
+              <a:avLst/>
+            </a:prstGeom>
+          </p:spPr>
+        </p:pic>
+        <p:pic>
+          <p:nvPicPr>
+            <p:cNvPr id="21" name="Graphic 20" descr="Speakers with solid fill">
+              <a:extLst>
+                <a:ext uri="{FF2B5EF4-FFF2-40B4-BE49-F238E27FC236}">
+                  <a16:creationId xmlns:a16="http://schemas.microsoft.com/office/drawing/2014/main" id="{E556013B-7937-B71D-10D3-7AF7A0410664}"/>
+                </a:ext>
+              </a:extLst>
+            </p:cNvPr>
+            <p:cNvPicPr>
+              <a:picLocks noChangeAspect="1"/>
+            </p:cNvPicPr>
+            <p:nvPr/>
+          </p:nvPicPr>
+          <p:blipFill rotWithShape="1">
+            <a:blip r:embed="rId4">
+              <a:extLst>
+                <a:ext uri="{28A0092B-C50C-407E-A947-70E740481C1C}">
+                  <a14:useLocalDpi xmlns:a14="http://schemas.microsoft.com/office/drawing/2010/main" val="0"/>
+                </a:ext>
+                <a:ext uri="{96DAC541-7B7A-43D3-8B79-37D633B846F1}">
+                  <asvg:svgBlip xmlns:asvg="http://schemas.microsoft.com/office/drawing/2016/SVG/main" r:embed="rId5"/>
+                </a:ext>
+              </a:extLst>
+            </a:blip>
+            <a:srcRect b="14483"/>
+            <a:stretch/>
+          </p:blipFill>
+          <p:spPr>
+            <a:xfrm>
+              <a:off x="2610593" y="4425047"/>
+              <a:ext cx="1828799" cy="1563926"/>
+            </a:xfrm>
+            <a:prstGeom prst="rect">
+              <a:avLst/>
+            </a:prstGeom>
+          </p:spPr>
+        </p:pic>
+        <p:pic>
+          <p:nvPicPr>
+            <p:cNvPr id="22" name="Graphic 21" descr="Fireworks with solid fill">
+              <a:extLst>
+                <a:ext uri="{FF2B5EF4-FFF2-40B4-BE49-F238E27FC236}">
+                  <a16:creationId xmlns:a16="http://schemas.microsoft.com/office/drawing/2014/main" id="{D60D1ED5-03A3-3BFF-EA5B-EA8069AC0745}"/>
+                </a:ext>
+              </a:extLst>
+            </p:cNvPr>
+            <p:cNvPicPr>
+              <a:picLocks noChangeAspect="1"/>
+            </p:cNvPicPr>
+            <p:nvPr/>
+          </p:nvPicPr>
+          <p:blipFill>
+            <a:blip r:embed="rId6">
+              <a:extLst>
+                <a:ext uri="{28A0092B-C50C-407E-A947-70E740481C1C}">
+                  <a14:useLocalDpi xmlns:a14="http://schemas.microsoft.com/office/drawing/2010/main" val="0"/>
+                </a:ext>
+                <a:ext uri="{96DAC541-7B7A-43D3-8B79-37D633B846F1}">
+                  <asvg:svgBlip xmlns:asvg="http://schemas.microsoft.com/office/drawing/2016/SVG/main" r:embed="rId7"/>
+                </a:ext>
+              </a:extLst>
+            </a:blip>
+            <a:stretch>
+              <a:fillRect/>
+            </a:stretch>
+          </p:blipFill>
+          <p:spPr>
+            <a:xfrm>
+              <a:off x="4664112" y="1145598"/>
+              <a:ext cx="2286001" cy="2286000"/>
+            </a:xfrm>
+            <a:prstGeom prst="rect">
+              <a:avLst/>
+            </a:prstGeom>
+          </p:spPr>
+        </p:pic>
+        <p:pic>
+          <p:nvPicPr>
+            <p:cNvPr id="23" name="Graphic 22" descr="Speakers with solid fill">
+              <a:extLst>
+                <a:ext uri="{FF2B5EF4-FFF2-40B4-BE49-F238E27FC236}">
+                  <a16:creationId xmlns:a16="http://schemas.microsoft.com/office/drawing/2014/main" id="{0ADCCA9A-F967-75D1-5D95-20E777267684}"/>
+                </a:ext>
+              </a:extLst>
+            </p:cNvPr>
+            <p:cNvPicPr>
+              <a:picLocks noChangeAspect="1"/>
+            </p:cNvPicPr>
+            <p:nvPr/>
+          </p:nvPicPr>
+          <p:blipFill rotWithShape="1">
+            <a:blip r:embed="rId4">
+              <a:extLst>
+                <a:ext uri="{28A0092B-C50C-407E-A947-70E740481C1C}">
+                  <a14:useLocalDpi xmlns:a14="http://schemas.microsoft.com/office/drawing/2010/main" val="0"/>
+                </a:ext>
+                <a:ext uri="{96DAC541-7B7A-43D3-8B79-37D633B846F1}">
+                  <asvg:svgBlip xmlns:asvg="http://schemas.microsoft.com/office/drawing/2016/SVG/main" r:embed="rId5"/>
+                </a:ext>
+              </a:extLst>
+            </a:blip>
+            <a:srcRect b="14483"/>
+            <a:stretch/>
+          </p:blipFill>
+          <p:spPr>
+            <a:xfrm>
+              <a:off x="7182593" y="4425049"/>
+              <a:ext cx="1828801" cy="1563926"/>
+            </a:xfrm>
+            <a:prstGeom prst="rect">
+              <a:avLst/>
+            </a:prstGeom>
+          </p:spPr>
+        </p:pic>
+        <p:pic>
+          <p:nvPicPr>
+            <p:cNvPr id="24" name="Graphic 23" descr="Music notation with solid fill">
+              <a:extLst>
+                <a:ext uri="{FF2B5EF4-FFF2-40B4-BE49-F238E27FC236}">
+                  <a16:creationId xmlns:a16="http://schemas.microsoft.com/office/drawing/2014/main" id="{AFA29867-6165-E2BF-2383-EA5885F07EA8}"/>
+                </a:ext>
+              </a:extLst>
+            </p:cNvPr>
+            <p:cNvPicPr>
+              <a:picLocks noChangeAspect="1"/>
+            </p:cNvPicPr>
+            <p:nvPr/>
+          </p:nvPicPr>
+          <p:blipFill>
+            <a:blip r:embed="rId8">
+              <a:extLst>
+                <a:ext uri="{28A0092B-C50C-407E-A947-70E740481C1C}">
+                  <a14:useLocalDpi xmlns:a14="http://schemas.microsoft.com/office/drawing/2010/main" val="0"/>
+                </a:ext>
+                <a:ext uri="{96DAC541-7B7A-43D3-8B79-37D633B846F1}">
+                  <asvg:svgBlip xmlns:asvg="http://schemas.microsoft.com/office/drawing/2016/SVG/main" r:embed="rId9"/>
+                </a:ext>
+              </a:extLst>
+            </a:blip>
+            <a:stretch>
+              <a:fillRect/>
+            </a:stretch>
+          </p:blipFill>
+          <p:spPr>
+            <a:xfrm>
+              <a:off x="2839194" y="3602497"/>
+              <a:ext cx="1371599" cy="1371600"/>
+            </a:xfrm>
+            <a:prstGeom prst="rect">
+              <a:avLst/>
+            </a:prstGeom>
+          </p:spPr>
+        </p:pic>
+        <p:pic>
+          <p:nvPicPr>
+            <p:cNvPr id="25" name="Graphic 24" descr="Music notation with solid fill">
+              <a:extLst>
+                <a:ext uri="{FF2B5EF4-FFF2-40B4-BE49-F238E27FC236}">
+                  <a16:creationId xmlns:a16="http://schemas.microsoft.com/office/drawing/2014/main" id="{3A40B298-6B56-446C-533B-D457AC8FF9F9}"/>
+                </a:ext>
+              </a:extLst>
+            </p:cNvPr>
+            <p:cNvPicPr>
+              <a:picLocks noChangeAspect="1"/>
+            </p:cNvPicPr>
+            <p:nvPr/>
+          </p:nvPicPr>
+          <p:blipFill>
+            <a:blip r:embed="rId8">
+              <a:extLst>
+                <a:ext uri="{28A0092B-C50C-407E-A947-70E740481C1C}">
+                  <a14:useLocalDpi xmlns:a14="http://schemas.microsoft.com/office/drawing/2010/main" val="0"/>
+                </a:ext>
+                <a:ext uri="{96DAC541-7B7A-43D3-8B79-37D633B846F1}">
+                  <asvg:svgBlip xmlns:asvg="http://schemas.microsoft.com/office/drawing/2016/SVG/main" r:embed="rId9"/>
+                </a:ext>
+              </a:extLst>
+            </a:blip>
+            <a:stretch>
+              <a:fillRect/>
+            </a:stretch>
+          </p:blipFill>
+          <p:spPr>
+            <a:xfrm>
+              <a:off x="7411194" y="3602497"/>
+              <a:ext cx="1371599" cy="1371602"/>
+            </a:xfrm>
+            <a:prstGeom prst="rect">
+              <a:avLst/>
+            </a:prstGeom>
+          </p:spPr>
+        </p:pic>
+      </p:grpSp>
+      <p:grpSp>
+        <p:nvGrpSpPr>
+          <p:cNvPr id="13" name="Group 12">
+            <a:extLst>
+              <a:ext uri="{FF2B5EF4-FFF2-40B4-BE49-F238E27FC236}">
+                <a16:creationId xmlns:a16="http://schemas.microsoft.com/office/drawing/2014/main" id="{4A487F63-F78B-3876-D616-7A526457EB9D}"/>
+              </a:ext>
+            </a:extLst>
+          </p:cNvPr>
+          <p:cNvGrpSpPr/>
+          <p:nvPr/>
+        </p:nvGrpSpPr>
+        <p:grpSpPr>
+          <a:xfrm>
+            <a:off x="6866331" y="1331100"/>
+            <a:ext cx="3657600" cy="3657600"/>
+            <a:chOff x="932256" y="1845450"/>
+            <a:chExt cx="5492244" cy="4381500"/>
+          </a:xfrm>
+        </p:grpSpPr>
+        <p:pic>
+          <p:nvPicPr>
+            <p:cNvPr id="15" name="Graphic 14" descr="Cycling with solid fill">
+              <a:extLst>
+                <a:ext uri="{FF2B5EF4-FFF2-40B4-BE49-F238E27FC236}">
+                  <a16:creationId xmlns:a16="http://schemas.microsoft.com/office/drawing/2014/main" id="{4DDDE898-9D53-2AA8-4591-E45D3BEA28E8}"/>
+                </a:ext>
+              </a:extLst>
+            </p:cNvPr>
+            <p:cNvPicPr>
+              <a:picLocks noChangeAspect="1"/>
+            </p:cNvPicPr>
+            <p:nvPr/>
+          </p:nvPicPr>
+          <p:blipFill>
+            <a:blip r:embed="rId10">
+              <a:extLst>
+                <a:ext uri="{28A0092B-C50C-407E-A947-70E740481C1C}">
+                  <a14:useLocalDpi xmlns:a14="http://schemas.microsoft.com/office/drawing/2010/main" val="0"/>
+                </a:ext>
+                <a:ext uri="{96DAC541-7B7A-43D3-8B79-37D633B846F1}">
+                  <asvg:svgBlip xmlns:asvg="http://schemas.microsoft.com/office/drawing/2016/SVG/main" r:embed="rId11"/>
+                </a:ext>
+              </a:extLst>
+            </a:blip>
+            <a:stretch>
+              <a:fillRect/>
+            </a:stretch>
+          </p:blipFill>
+          <p:spPr>
+            <a:xfrm>
+              <a:off x="1924209" y="2902125"/>
+              <a:ext cx="1828800" cy="1828800"/>
+            </a:xfrm>
+            <a:prstGeom prst="rect">
+              <a:avLst/>
+            </a:prstGeom>
+          </p:spPr>
+        </p:pic>
+        <p:pic>
+          <p:nvPicPr>
+            <p:cNvPr id="17" name="Graphic 16" descr="Golf with solid fill">
+              <a:extLst>
+                <a:ext uri="{FF2B5EF4-FFF2-40B4-BE49-F238E27FC236}">
+                  <a16:creationId xmlns:a16="http://schemas.microsoft.com/office/drawing/2014/main" id="{214174DA-6D25-5567-2B66-4C70DD286EAE}"/>
+                </a:ext>
+              </a:extLst>
+            </p:cNvPr>
+            <p:cNvPicPr>
+              <a:picLocks noChangeAspect="1"/>
+            </p:cNvPicPr>
+            <p:nvPr/>
+          </p:nvPicPr>
+          <p:blipFill>
+            <a:blip r:embed="rId12">
+              <a:extLst>
+                <a:ext uri="{28A0092B-C50C-407E-A947-70E740481C1C}">
+                  <a14:useLocalDpi xmlns:a14="http://schemas.microsoft.com/office/drawing/2010/main" val="0"/>
+                </a:ext>
+                <a:ext uri="{96DAC541-7B7A-43D3-8B79-37D633B846F1}">
+                  <asvg:svgBlip xmlns:asvg="http://schemas.microsoft.com/office/drawing/2016/SVG/main" r:embed="rId13"/>
+                </a:ext>
+              </a:extLst>
+            </a:blip>
+            <a:stretch>
+              <a:fillRect/>
+            </a:stretch>
+          </p:blipFill>
+          <p:spPr>
+            <a:xfrm>
+              <a:off x="1231290" y="1845450"/>
+              <a:ext cx="1828800" cy="1828800"/>
+            </a:xfrm>
+            <a:prstGeom prst="rect">
+              <a:avLst/>
+            </a:prstGeom>
+          </p:spPr>
+        </p:pic>
+        <p:pic>
+          <p:nvPicPr>
+            <p:cNvPr id="26" name="Graphic 25" descr="Golf clubs with solid fill">
+              <a:extLst>
+                <a:ext uri="{FF2B5EF4-FFF2-40B4-BE49-F238E27FC236}">
+                  <a16:creationId xmlns:a16="http://schemas.microsoft.com/office/drawing/2014/main" id="{788156F5-5FC8-33AD-D23D-38E0BB9582A9}"/>
+                </a:ext>
+              </a:extLst>
+            </p:cNvPr>
+            <p:cNvPicPr>
+              <a:picLocks noChangeAspect="1"/>
+            </p:cNvPicPr>
+            <p:nvPr/>
+          </p:nvPicPr>
+          <p:blipFill>
+            <a:blip r:embed="rId14">
+              <a:extLst>
+                <a:ext uri="{28A0092B-C50C-407E-A947-70E740481C1C}">
+                  <a14:useLocalDpi xmlns:a14="http://schemas.microsoft.com/office/drawing/2010/main" val="0"/>
+                </a:ext>
+                <a:ext uri="{96DAC541-7B7A-43D3-8B79-37D633B846F1}">
+                  <asvg:svgBlip xmlns:asvg="http://schemas.microsoft.com/office/drawing/2016/SVG/main" r:embed="rId15"/>
+                </a:ext>
+              </a:extLst>
+            </a:blip>
+            <a:stretch>
+              <a:fillRect/>
+            </a:stretch>
+          </p:blipFill>
+          <p:spPr>
+            <a:xfrm>
+              <a:off x="932256" y="2759850"/>
+              <a:ext cx="914400" cy="914400"/>
+            </a:xfrm>
+            <a:prstGeom prst="rect">
+              <a:avLst/>
+            </a:prstGeom>
+          </p:spPr>
+        </p:pic>
+        <p:pic>
+          <p:nvPicPr>
+            <p:cNvPr id="27" name="Graphic 26" descr="Golf Flag In Hole with solid fill">
+              <a:extLst>
+                <a:ext uri="{FF2B5EF4-FFF2-40B4-BE49-F238E27FC236}">
+                  <a16:creationId xmlns:a16="http://schemas.microsoft.com/office/drawing/2014/main" id="{029116C4-DB0D-E10E-002D-382D42B470CC}"/>
+                </a:ext>
+              </a:extLst>
+            </p:cNvPr>
+            <p:cNvPicPr>
+              <a:picLocks noChangeAspect="1"/>
+            </p:cNvPicPr>
+            <p:nvPr/>
+          </p:nvPicPr>
+          <p:blipFill>
+            <a:blip r:embed="rId16">
+              <a:extLst>
+                <a:ext uri="{28A0092B-C50C-407E-A947-70E740481C1C}">
+                  <a14:useLocalDpi xmlns:a14="http://schemas.microsoft.com/office/drawing/2010/main" val="0"/>
+                </a:ext>
+                <a:ext uri="{96DAC541-7B7A-43D3-8B79-37D633B846F1}">
+                  <asvg:svgBlip xmlns:asvg="http://schemas.microsoft.com/office/drawing/2016/SVG/main" r:embed="rId17"/>
+                </a:ext>
+              </a:extLst>
+            </a:blip>
+            <a:stretch>
+              <a:fillRect/>
+            </a:stretch>
+          </p:blipFill>
+          <p:spPr>
+            <a:xfrm>
+              <a:off x="3740352" y="1845450"/>
+              <a:ext cx="855348" cy="1921545"/>
+            </a:xfrm>
+            <a:prstGeom prst="rect">
+              <a:avLst/>
+            </a:prstGeom>
+          </p:spPr>
+        </p:pic>
+        <p:pic>
+          <p:nvPicPr>
+            <p:cNvPr id="28" name="Graphic 27" descr="Soccer Goal with solid fill">
+              <a:extLst>
+                <a:ext uri="{FF2B5EF4-FFF2-40B4-BE49-F238E27FC236}">
+                  <a16:creationId xmlns:a16="http://schemas.microsoft.com/office/drawing/2014/main" id="{28AEA685-E858-27BC-6403-7C3D0E4BF00C}"/>
+                </a:ext>
+              </a:extLst>
+            </p:cNvPr>
+            <p:cNvPicPr>
+              <a:picLocks noChangeAspect="1"/>
+            </p:cNvPicPr>
+            <p:nvPr/>
+          </p:nvPicPr>
+          <p:blipFill>
+            <a:blip r:embed="rId18">
+              <a:extLst>
+                <a:ext uri="{28A0092B-C50C-407E-A947-70E740481C1C}">
+                  <a14:useLocalDpi xmlns:a14="http://schemas.microsoft.com/office/drawing/2010/main" val="0"/>
+                </a:ext>
+                <a:ext uri="{96DAC541-7B7A-43D3-8B79-37D633B846F1}">
+                  <asvg:svgBlip xmlns:asvg="http://schemas.microsoft.com/office/drawing/2016/SVG/main" r:embed="rId19"/>
+                </a:ext>
+              </a:extLst>
+            </a:blip>
+            <a:stretch>
+              <a:fillRect/>
+            </a:stretch>
+          </p:blipFill>
+          <p:spPr>
+            <a:xfrm>
+              <a:off x="4586934" y="2902125"/>
+              <a:ext cx="1828800" cy="1828800"/>
+            </a:xfrm>
+            <a:prstGeom prst="rect">
+              <a:avLst/>
+            </a:prstGeom>
+          </p:spPr>
+        </p:pic>
+        <p:pic>
+          <p:nvPicPr>
+            <p:cNvPr id="29" name="Graphic 28" descr="Soccer with solid fill">
+              <a:extLst>
+                <a:ext uri="{FF2B5EF4-FFF2-40B4-BE49-F238E27FC236}">
+                  <a16:creationId xmlns:a16="http://schemas.microsoft.com/office/drawing/2014/main" id="{7B004778-C930-0C24-C658-A343FD3B26A5}"/>
+                </a:ext>
+              </a:extLst>
+            </p:cNvPr>
+            <p:cNvPicPr>
+              <a:picLocks noChangeAspect="1"/>
+            </p:cNvPicPr>
+            <p:nvPr/>
+          </p:nvPicPr>
+          <p:blipFill>
+            <a:blip r:embed="rId20">
+              <a:extLst>
+                <a:ext uri="{28A0092B-C50C-407E-A947-70E740481C1C}">
+                  <a14:useLocalDpi xmlns:a14="http://schemas.microsoft.com/office/drawing/2010/main" val="0"/>
+                </a:ext>
+                <a:ext uri="{96DAC541-7B7A-43D3-8B79-37D633B846F1}">
+                  <asvg:svgBlip xmlns:asvg="http://schemas.microsoft.com/office/drawing/2016/SVG/main" r:embed="rId21"/>
+                </a:ext>
+              </a:extLst>
+            </a:blip>
+            <a:stretch>
+              <a:fillRect/>
+            </a:stretch>
+          </p:blipFill>
+          <p:spPr>
+            <a:xfrm>
+              <a:off x="4595700" y="4398150"/>
+              <a:ext cx="1828800" cy="1828800"/>
+            </a:xfrm>
+            <a:prstGeom prst="rect">
+              <a:avLst/>
+            </a:prstGeom>
+          </p:spPr>
+        </p:pic>
+        <p:pic>
+          <p:nvPicPr>
+            <p:cNvPr id="30" name="Graphic 29" descr="Tennis with solid fill">
+              <a:extLst>
+                <a:ext uri="{FF2B5EF4-FFF2-40B4-BE49-F238E27FC236}">
+                  <a16:creationId xmlns:a16="http://schemas.microsoft.com/office/drawing/2014/main" id="{FE0D0706-CE67-E6A6-1015-AAD49765D1BE}"/>
+                </a:ext>
+              </a:extLst>
+            </p:cNvPr>
+            <p:cNvPicPr>
+              <a:picLocks noChangeAspect="1"/>
+            </p:cNvPicPr>
+            <p:nvPr/>
+          </p:nvPicPr>
+          <p:blipFill>
+            <a:blip r:embed="rId22">
+              <a:extLst>
+                <a:ext uri="{28A0092B-C50C-407E-A947-70E740481C1C}">
+                  <a14:useLocalDpi xmlns:a14="http://schemas.microsoft.com/office/drawing/2010/main" val="0"/>
+                </a:ext>
+                <a:ext uri="{96DAC541-7B7A-43D3-8B79-37D633B846F1}">
+                  <asvg:svgBlip xmlns:asvg="http://schemas.microsoft.com/office/drawing/2016/SVG/main" r:embed="rId23"/>
+                </a:ext>
+              </a:extLst>
+            </a:blip>
+            <a:stretch>
+              <a:fillRect/>
+            </a:stretch>
+          </p:blipFill>
+          <p:spPr>
+            <a:xfrm>
+              <a:off x="938100" y="4398150"/>
+              <a:ext cx="1828800" cy="1828800"/>
+            </a:xfrm>
+            <a:prstGeom prst="rect">
+              <a:avLst/>
+            </a:prstGeom>
+          </p:spPr>
+        </p:pic>
+        <p:pic>
+          <p:nvPicPr>
+            <p:cNvPr id="31" name="Graphic 30" descr="Tennis with solid fill">
+              <a:extLst>
+                <a:ext uri="{FF2B5EF4-FFF2-40B4-BE49-F238E27FC236}">
+                  <a16:creationId xmlns:a16="http://schemas.microsoft.com/office/drawing/2014/main" id="{3155E8E1-367E-8CC2-54B1-FFE18C6C7124}"/>
+                </a:ext>
+              </a:extLst>
+            </p:cNvPr>
+            <p:cNvPicPr>
+              <a:picLocks noChangeAspect="1"/>
+            </p:cNvPicPr>
+            <p:nvPr/>
+          </p:nvPicPr>
+          <p:blipFill>
+            <a:blip r:embed="rId22">
+              <a:extLst>
+                <a:ext uri="{28A0092B-C50C-407E-A947-70E740481C1C}">
+                  <a14:useLocalDpi xmlns:a14="http://schemas.microsoft.com/office/drawing/2010/main" val="0"/>
+                </a:ext>
+                <a:ext uri="{96DAC541-7B7A-43D3-8B79-37D633B846F1}">
+                  <asvg:svgBlip xmlns:asvg="http://schemas.microsoft.com/office/drawing/2016/SVG/main" r:embed="rId23"/>
+                </a:ext>
+              </a:extLst>
+            </a:blip>
+            <a:stretch>
+              <a:fillRect/>
+            </a:stretch>
+          </p:blipFill>
+          <p:spPr>
+            <a:xfrm flipH="1">
+              <a:off x="2766900" y="4398150"/>
+              <a:ext cx="1828800" cy="1828800"/>
+            </a:xfrm>
+            <a:prstGeom prst="rect">
+              <a:avLst/>
+            </a:prstGeom>
+          </p:spPr>
+        </p:pic>
+      </p:grpSp>
+    </p:spTree>
+    <p:extLst>
+      <p:ext uri="{BB962C8B-B14F-4D97-AF65-F5344CB8AC3E}">
+        <p14:creationId xmlns:p14="http://schemas.microsoft.com/office/powerpoint/2010/main" val="1588507449"/>
+      </p:ext>
+    </p:extLst>
+  </p:cSld>
+  <p:clrMapOvr>
+    <a:masterClrMapping/>
+  </p:clrMapOvr>
+</p:sld>
+</file>
+
+<file path=ppt/slides/slide7.xml><?xml version="1.0" encoding="utf-8"?>
+<p:sld xmlns:a="http://schemas.openxmlformats.org/drawingml/2006/main" xmlns:r="http://schemas.openxmlformats.org/officeDocument/2006/relationships" xmlns:p="http://schemas.openxmlformats.org/presentationml/2006/main">
+  <p:cSld>
+    <p:spTree>
+      <p:nvGrpSpPr>
+        <p:cNvPr id="1" name=""/>
+        <p:cNvGrpSpPr/>
+        <p:nvPr/>
+      </p:nvGrpSpPr>
+      <p:grpSpPr>
+        <a:xfrm>
+          <a:off x="0" y="0"/>
+          <a:ext cx="0" cy="0"/>
+          <a:chOff x="0" y="0"/>
+          <a:chExt cx="0" cy="0"/>
+        </a:xfrm>
+      </p:grpSpPr>
+      <p:pic>
+        <p:nvPicPr>
+          <p:cNvPr id="26" name="Graphic 25" descr="Catering with solid fill">
+            <a:extLst>
+              <a:ext uri="{FF2B5EF4-FFF2-40B4-BE49-F238E27FC236}">
+                <a16:creationId xmlns:a16="http://schemas.microsoft.com/office/drawing/2014/main" id="{7D17B0D6-6A1F-049A-56A8-81034AF1EA83}"/>
+              </a:ext>
+            </a:extLst>
+          </p:cNvPr>
+          <p:cNvPicPr>
+            <a:picLocks noChangeAspect="1"/>
+          </p:cNvPicPr>
+          <p:nvPr/>
+        </p:nvPicPr>
+        <p:blipFill rotWithShape="1">
+          <a:blip r:embed="rId2">
+            <a:extLst>
+              <a:ext uri="{28A0092B-C50C-407E-A947-70E740481C1C}">
+                <a14:useLocalDpi xmlns:a14="http://schemas.microsoft.com/office/drawing/2010/main" val="0"/>
+              </a:ext>
+              <a:ext uri="{96DAC541-7B7A-43D3-8B79-37D633B846F1}">
+                <asvg:svgBlip xmlns:asvg="http://schemas.microsoft.com/office/drawing/2016/SVG/main" r:embed="rId3"/>
+              </a:ext>
+            </a:extLst>
+          </a:blip>
+          <a:srcRect l="-10606" t="-15216" r="-10606" b="-5996"/>
+          <a:stretch/>
+        </p:blipFill>
+        <p:spPr>
+          <a:xfrm>
+            <a:off x="8534401" y="-572368"/>
+            <a:ext cx="3657599" cy="3657600"/>
+          </a:xfrm>
+          <a:prstGeom prst="rect">
+            <a:avLst/>
+          </a:prstGeom>
+        </p:spPr>
+      </p:pic>
+      <p:pic>
+        <p:nvPicPr>
+          <p:cNvPr id="43" name="Graphic 42" descr="Bus with solid fill">
+            <a:extLst>
+              <a:ext uri="{FF2B5EF4-FFF2-40B4-BE49-F238E27FC236}">
+                <a16:creationId xmlns:a16="http://schemas.microsoft.com/office/drawing/2014/main" id="{41CF56A7-97AC-D00B-580F-7EC908759822}"/>
+              </a:ext>
+            </a:extLst>
+          </p:cNvPr>
+          <p:cNvPicPr>
+            <a:picLocks noChangeAspect="1"/>
+          </p:cNvPicPr>
+          <p:nvPr/>
+        </p:nvPicPr>
+        <p:blipFill rotWithShape="1">
+          <a:blip r:embed="rId4">
+            <a:extLst>
+              <a:ext uri="{28A0092B-C50C-407E-A947-70E740481C1C}">
+                <a14:useLocalDpi xmlns:a14="http://schemas.microsoft.com/office/drawing/2010/main" val="0"/>
+              </a:ext>
+              <a:ext uri="{96DAC541-7B7A-43D3-8B79-37D633B846F1}">
+                <asvg:svgBlip xmlns:asvg="http://schemas.microsoft.com/office/drawing/2016/SVG/main" r:embed="rId5"/>
+              </a:ext>
+            </a:extLst>
+          </a:blip>
+          <a:srcRect l="-2388" t="-12790" r="-2588" b="12793"/>
+          <a:stretch/>
+        </p:blipFill>
+        <p:spPr>
+          <a:xfrm>
+            <a:off x="1100072" y="-481843"/>
+            <a:ext cx="3657600" cy="3657600"/>
+          </a:xfrm>
+          <a:prstGeom prst="rect">
+            <a:avLst/>
+          </a:prstGeom>
+        </p:spPr>
+      </p:pic>
+      <p:grpSp>
+        <p:nvGrpSpPr>
+          <p:cNvPr id="44" name="Group 43">
+            <a:extLst>
+              <a:ext uri="{FF2B5EF4-FFF2-40B4-BE49-F238E27FC236}">
+                <a16:creationId xmlns:a16="http://schemas.microsoft.com/office/drawing/2014/main" id="{20E123BD-726D-8E5B-6DF4-7159BF430119}"/>
+              </a:ext>
+            </a:extLst>
+          </p:cNvPr>
+          <p:cNvGrpSpPr/>
+          <p:nvPr/>
+        </p:nvGrpSpPr>
+        <p:grpSpPr>
+          <a:xfrm>
+            <a:off x="5652007" y="2738393"/>
+            <a:ext cx="3657600" cy="3657600"/>
+            <a:chOff x="932261" y="2473003"/>
+            <a:chExt cx="5492234" cy="4221761"/>
+          </a:xfrm>
+        </p:grpSpPr>
+        <p:pic>
+          <p:nvPicPr>
+            <p:cNvPr id="46" name="Graphic 45" descr="Golf with solid fill">
+              <a:extLst>
+                <a:ext uri="{FF2B5EF4-FFF2-40B4-BE49-F238E27FC236}">
+                  <a16:creationId xmlns:a16="http://schemas.microsoft.com/office/drawing/2014/main" id="{EBF933DE-C2C3-C9AE-A7B4-E4D3C685FA9A}"/>
+                </a:ext>
+              </a:extLst>
+            </p:cNvPr>
+            <p:cNvPicPr>
+              <a:picLocks noChangeAspect="1"/>
+            </p:cNvPicPr>
+            <p:nvPr/>
+          </p:nvPicPr>
+          <p:blipFill rotWithShape="1">
+            <a:blip r:embed="rId6">
+              <a:extLst>
+                <a:ext uri="{28A0092B-C50C-407E-A947-70E740481C1C}">
+                  <a14:useLocalDpi xmlns:a14="http://schemas.microsoft.com/office/drawing/2010/main" val="0"/>
+                </a:ext>
+                <a:ext uri="{96DAC541-7B7A-43D3-8B79-37D633B846F1}">
+                  <asvg:svgBlip xmlns:asvg="http://schemas.microsoft.com/office/drawing/2016/SVG/main" r:embed="rId7"/>
+                </a:ext>
+              </a:extLst>
+            </a:blip>
+            <a:srcRect t="-9017" b="1"/>
+            <a:stretch/>
+          </p:blipFill>
+          <p:spPr>
+            <a:xfrm>
+              <a:off x="1474441" y="2473003"/>
+              <a:ext cx="1828799" cy="1993719"/>
+            </a:xfrm>
+            <a:prstGeom prst="rect">
+              <a:avLst/>
+            </a:prstGeom>
+          </p:spPr>
+        </p:pic>
+        <p:pic>
+          <p:nvPicPr>
+            <p:cNvPr id="47" name="Graphic 46" descr="Golf clubs with solid fill">
+              <a:extLst>
+                <a:ext uri="{FF2B5EF4-FFF2-40B4-BE49-F238E27FC236}">
+                  <a16:creationId xmlns:a16="http://schemas.microsoft.com/office/drawing/2014/main" id="{ACED7DA2-17B9-0D41-9A71-6FF0A6DA0A25}"/>
+                </a:ext>
+              </a:extLst>
+            </p:cNvPr>
+            <p:cNvPicPr>
+              <a:picLocks noChangeAspect="1"/>
+            </p:cNvPicPr>
+            <p:nvPr/>
+          </p:nvPicPr>
+          <p:blipFill>
+            <a:blip r:embed="rId8">
+              <a:extLst>
+                <a:ext uri="{28A0092B-C50C-407E-A947-70E740481C1C}">
+                  <a14:useLocalDpi xmlns:a14="http://schemas.microsoft.com/office/drawing/2010/main" val="0"/>
+                </a:ext>
+                <a:ext uri="{96DAC541-7B7A-43D3-8B79-37D633B846F1}">
+                  <asvg:svgBlip xmlns:asvg="http://schemas.microsoft.com/office/drawing/2016/SVG/main" r:embed="rId9"/>
+                </a:ext>
+              </a:extLst>
+            </a:blip>
+            <a:stretch>
+              <a:fillRect/>
+            </a:stretch>
+          </p:blipFill>
+          <p:spPr>
+            <a:xfrm>
+              <a:off x="1175407" y="3552316"/>
+              <a:ext cx="914399" cy="914401"/>
+            </a:xfrm>
+            <a:prstGeom prst="rect">
+              <a:avLst/>
+            </a:prstGeom>
+          </p:spPr>
+        </p:pic>
+        <p:pic>
+          <p:nvPicPr>
+            <p:cNvPr id="48" name="Graphic 47" descr="Golf Flag In Hole with solid fill">
+              <a:extLst>
+                <a:ext uri="{FF2B5EF4-FFF2-40B4-BE49-F238E27FC236}">
+                  <a16:creationId xmlns:a16="http://schemas.microsoft.com/office/drawing/2014/main" id="{AF0D877C-569B-944B-6012-96D888EAC6A2}"/>
+                </a:ext>
+              </a:extLst>
+            </p:cNvPr>
+            <p:cNvPicPr>
+              <a:picLocks noChangeAspect="1"/>
+            </p:cNvPicPr>
+            <p:nvPr/>
+          </p:nvPicPr>
+          <p:blipFill>
+            <a:blip r:embed="rId10">
+              <a:extLst>
+                <a:ext uri="{28A0092B-C50C-407E-A947-70E740481C1C}">
+                  <a14:useLocalDpi xmlns:a14="http://schemas.microsoft.com/office/drawing/2010/main" val="0"/>
+                </a:ext>
+                <a:ext uri="{96DAC541-7B7A-43D3-8B79-37D633B846F1}">
+                  <asvg:svgBlip xmlns:asvg="http://schemas.microsoft.com/office/drawing/2016/SVG/main" r:embed="rId11"/>
+                </a:ext>
+              </a:extLst>
+            </a:blip>
+            <a:stretch>
+              <a:fillRect/>
+            </a:stretch>
+          </p:blipFill>
+          <p:spPr>
+            <a:xfrm>
+              <a:off x="3468600" y="2637916"/>
+              <a:ext cx="855348" cy="1921547"/>
+            </a:xfrm>
+            <a:prstGeom prst="rect">
+              <a:avLst/>
+            </a:prstGeom>
+          </p:spPr>
+        </p:pic>
+        <p:pic>
+          <p:nvPicPr>
+            <p:cNvPr id="49" name="Graphic 48" descr="Soccer Goal with solid fill">
+              <a:extLst>
+                <a:ext uri="{FF2B5EF4-FFF2-40B4-BE49-F238E27FC236}">
+                  <a16:creationId xmlns:a16="http://schemas.microsoft.com/office/drawing/2014/main" id="{2691DB1F-8195-4B3E-2217-145580A7C37B}"/>
+                </a:ext>
+              </a:extLst>
+            </p:cNvPr>
+            <p:cNvPicPr>
+              <a:picLocks noChangeAspect="1"/>
+            </p:cNvPicPr>
+            <p:nvPr/>
+          </p:nvPicPr>
+          <p:blipFill>
+            <a:blip r:embed="rId12">
+              <a:extLst>
+                <a:ext uri="{28A0092B-C50C-407E-A947-70E740481C1C}">
+                  <a14:useLocalDpi xmlns:a14="http://schemas.microsoft.com/office/drawing/2010/main" val="0"/>
+                </a:ext>
+                <a:ext uri="{96DAC541-7B7A-43D3-8B79-37D633B846F1}">
+                  <asvg:svgBlip xmlns:asvg="http://schemas.microsoft.com/office/drawing/2016/SVG/main" r:embed="rId13"/>
+                </a:ext>
+              </a:extLst>
+            </a:blip>
+            <a:stretch>
+              <a:fillRect/>
+            </a:stretch>
+          </p:blipFill>
+          <p:spPr>
+            <a:xfrm>
+              <a:off x="4400997" y="3146907"/>
+              <a:ext cx="1828799" cy="1828802"/>
+            </a:xfrm>
+            <a:prstGeom prst="rect">
+              <a:avLst/>
+            </a:prstGeom>
+          </p:spPr>
+        </p:pic>
+        <p:pic>
+          <p:nvPicPr>
+            <p:cNvPr id="50" name="Graphic 49" descr="Soccer with solid fill">
+              <a:extLst>
+                <a:ext uri="{FF2B5EF4-FFF2-40B4-BE49-F238E27FC236}">
+                  <a16:creationId xmlns:a16="http://schemas.microsoft.com/office/drawing/2014/main" id="{B2E7D3BB-4DF5-A13E-5912-A3A7F66F36B8}"/>
+                </a:ext>
+              </a:extLst>
+            </p:cNvPr>
+            <p:cNvPicPr>
+              <a:picLocks noChangeAspect="1"/>
+            </p:cNvPicPr>
+            <p:nvPr/>
+          </p:nvPicPr>
+          <p:blipFill rotWithShape="1">
+            <a:blip r:embed="rId14">
+              <a:extLst>
+                <a:ext uri="{28A0092B-C50C-407E-A947-70E740481C1C}">
+                  <a14:useLocalDpi xmlns:a14="http://schemas.microsoft.com/office/drawing/2010/main" val="0"/>
+                </a:ext>
+                <a:ext uri="{96DAC541-7B7A-43D3-8B79-37D633B846F1}">
+                  <asvg:svgBlip xmlns:asvg="http://schemas.microsoft.com/office/drawing/2016/SVG/main" r:embed="rId15"/>
+                </a:ext>
+              </a:extLst>
+            </a:blip>
+            <a:srcRect l="-1" t="-1" r="-10167" b="-23708"/>
+            <a:stretch/>
+          </p:blipFill>
+          <p:spPr>
+            <a:xfrm>
+              <a:off x="4409763" y="4432382"/>
+              <a:ext cx="2014732" cy="2262382"/>
+            </a:xfrm>
+            <a:prstGeom prst="rect">
+              <a:avLst/>
+            </a:prstGeom>
+          </p:spPr>
+        </p:pic>
+        <p:pic>
+          <p:nvPicPr>
+            <p:cNvPr id="51" name="Graphic 50" descr="Tennis with solid fill">
+              <a:extLst>
+                <a:ext uri="{FF2B5EF4-FFF2-40B4-BE49-F238E27FC236}">
+                  <a16:creationId xmlns:a16="http://schemas.microsoft.com/office/drawing/2014/main" id="{9D35AB8C-F861-7689-D863-D8D8A856BF2D}"/>
+                </a:ext>
+              </a:extLst>
+            </p:cNvPr>
+            <p:cNvPicPr>
+              <a:picLocks noChangeAspect="1"/>
+            </p:cNvPicPr>
+            <p:nvPr/>
+          </p:nvPicPr>
+          <p:blipFill rotWithShape="1">
+            <a:blip r:embed="rId16">
+              <a:extLst>
+                <a:ext uri="{28A0092B-C50C-407E-A947-70E740481C1C}">
+                  <a14:useLocalDpi xmlns:a14="http://schemas.microsoft.com/office/drawing/2010/main" val="0"/>
+                </a:ext>
+                <a:ext uri="{96DAC541-7B7A-43D3-8B79-37D633B846F1}">
+                  <asvg:svgBlip xmlns:asvg="http://schemas.microsoft.com/office/drawing/2016/SVG/main" r:embed="rId17"/>
+                </a:ext>
+              </a:extLst>
+            </a:blip>
+            <a:srcRect l="-13615" r="1" b="-20123"/>
+            <a:stretch/>
+          </p:blipFill>
+          <p:spPr>
+            <a:xfrm>
+              <a:off x="932261" y="4398150"/>
+              <a:ext cx="2077790" cy="2196798"/>
+            </a:xfrm>
+            <a:prstGeom prst="rect">
+              <a:avLst/>
+            </a:prstGeom>
+          </p:spPr>
+        </p:pic>
+        <p:pic>
+          <p:nvPicPr>
+            <p:cNvPr id="52" name="Graphic 51" descr="Tennis with solid fill">
+              <a:extLst>
+                <a:ext uri="{FF2B5EF4-FFF2-40B4-BE49-F238E27FC236}">
+                  <a16:creationId xmlns:a16="http://schemas.microsoft.com/office/drawing/2014/main" id="{E55DDEBD-DA5C-A442-8A02-6834452A3993}"/>
+                </a:ext>
+              </a:extLst>
+            </p:cNvPr>
+            <p:cNvPicPr>
+              <a:picLocks noChangeAspect="1"/>
+            </p:cNvPicPr>
+            <p:nvPr/>
+          </p:nvPicPr>
+          <p:blipFill rotWithShape="1">
+            <a:blip r:embed="rId16">
+              <a:extLst>
+                <a:ext uri="{28A0092B-C50C-407E-A947-70E740481C1C}">
+                  <a14:useLocalDpi xmlns:a14="http://schemas.microsoft.com/office/drawing/2010/main" val="0"/>
+                </a:ext>
+                <a:ext uri="{96DAC541-7B7A-43D3-8B79-37D633B846F1}">
+                  <asvg:svgBlip xmlns:asvg="http://schemas.microsoft.com/office/drawing/2016/SVG/main" r:embed="rId17"/>
+                </a:ext>
+              </a:extLst>
+            </a:blip>
+            <a:srcRect t="1" b="-20122"/>
+            <a:stretch/>
+          </p:blipFill>
+          <p:spPr>
+            <a:xfrm flipH="1">
+              <a:off x="2766898" y="4398149"/>
+              <a:ext cx="1828800" cy="2196799"/>
+            </a:xfrm>
+            <a:prstGeom prst="rect">
+              <a:avLst/>
+            </a:prstGeom>
+          </p:spPr>
+        </p:pic>
+      </p:grpSp>
+    </p:spTree>
+    <p:extLst>
+      <p:ext uri="{BB962C8B-B14F-4D97-AF65-F5344CB8AC3E}">
+        <p14:creationId xmlns:p14="http://schemas.microsoft.com/office/powerpoint/2010/main" val="2984257509"/>
+      </p:ext>
+    </p:extLst>
+  </p:cSld>
+  <p:clrMapOvr>
+    <a:masterClrMapping/>
+  </p:clrMapOvr>
+</p:sld>
+</file>
+
 <file path=ppt/theme/theme1.xml><?xml version="1.0" encoding="utf-8"?>
 <a:theme xmlns:a="http://schemas.openxmlformats.org/drawingml/2006/main" name="Office Theme">
   <a:themeElements>

</xml_diff>

<commit_message>
navigation bar for mobile/tablets ongoing
</commit_message>
<xml_diff>
--- a/Event Organizer App/app_images/App_Images.pptx
+++ b/Event Organizer App/app_images/App_Images.pptx
@@ -13,6 +13,7 @@
     <p:sldId id="259" r:id="rId7"/>
     <p:sldId id="260" r:id="rId8"/>
     <p:sldId id="264" r:id="rId9"/>
+    <p:sldId id="265" r:id="rId10"/>
   </p:sldIdLst>
   <p:sldSz cx="12192000" cy="6858000"/>
   <p:notesSz cx="6858000" cy="9144000"/>
@@ -266,7 +267,7 @@
           <a:p>
             <a:fld id="{F2CF84AC-730A-472F-B1D8-F72CDD076E52}" type="datetimeFigureOut">
               <a:rPr lang="en-US" smtClean="0"/>
-              <a:t>1/27/2024</a:t>
+              <a:t>1/28/2024</a:t>
             </a:fld>
             <a:endParaRPr lang="en-US"/>
           </a:p>
@@ -464,7 +465,7 @@
           <a:p>
             <a:fld id="{F2CF84AC-730A-472F-B1D8-F72CDD076E52}" type="datetimeFigureOut">
               <a:rPr lang="en-US" smtClean="0"/>
-              <a:t>1/27/2024</a:t>
+              <a:t>1/28/2024</a:t>
             </a:fld>
             <a:endParaRPr lang="en-US"/>
           </a:p>
@@ -672,7 +673,7 @@
           <a:p>
             <a:fld id="{F2CF84AC-730A-472F-B1D8-F72CDD076E52}" type="datetimeFigureOut">
               <a:rPr lang="en-US" smtClean="0"/>
-              <a:t>1/27/2024</a:t>
+              <a:t>1/28/2024</a:t>
             </a:fld>
             <a:endParaRPr lang="en-US"/>
           </a:p>
@@ -870,7 +871,7 @@
           <a:p>
             <a:fld id="{F2CF84AC-730A-472F-B1D8-F72CDD076E52}" type="datetimeFigureOut">
               <a:rPr lang="en-US" smtClean="0"/>
-              <a:t>1/27/2024</a:t>
+              <a:t>1/28/2024</a:t>
             </a:fld>
             <a:endParaRPr lang="en-US"/>
           </a:p>
@@ -1145,7 +1146,7 @@
           <a:p>
             <a:fld id="{F2CF84AC-730A-472F-B1D8-F72CDD076E52}" type="datetimeFigureOut">
               <a:rPr lang="en-US" smtClean="0"/>
-              <a:t>1/27/2024</a:t>
+              <a:t>1/28/2024</a:t>
             </a:fld>
             <a:endParaRPr lang="en-US"/>
           </a:p>
@@ -1410,7 +1411,7 @@
           <a:p>
             <a:fld id="{F2CF84AC-730A-472F-B1D8-F72CDD076E52}" type="datetimeFigureOut">
               <a:rPr lang="en-US" smtClean="0"/>
-              <a:t>1/27/2024</a:t>
+              <a:t>1/28/2024</a:t>
             </a:fld>
             <a:endParaRPr lang="en-US"/>
           </a:p>
@@ -1822,7 +1823,7 @@
           <a:p>
             <a:fld id="{F2CF84AC-730A-472F-B1D8-F72CDD076E52}" type="datetimeFigureOut">
               <a:rPr lang="en-US" smtClean="0"/>
-              <a:t>1/27/2024</a:t>
+              <a:t>1/28/2024</a:t>
             </a:fld>
             <a:endParaRPr lang="en-US"/>
           </a:p>
@@ -1963,7 +1964,7 @@
           <a:p>
             <a:fld id="{F2CF84AC-730A-472F-B1D8-F72CDD076E52}" type="datetimeFigureOut">
               <a:rPr lang="en-US" smtClean="0"/>
-              <a:t>1/27/2024</a:t>
+              <a:t>1/28/2024</a:t>
             </a:fld>
             <a:endParaRPr lang="en-US"/>
           </a:p>
@@ -2076,7 +2077,7 @@
           <a:p>
             <a:fld id="{F2CF84AC-730A-472F-B1D8-F72CDD076E52}" type="datetimeFigureOut">
               <a:rPr lang="en-US" smtClean="0"/>
-              <a:t>1/27/2024</a:t>
+              <a:t>1/28/2024</a:t>
             </a:fld>
             <a:endParaRPr lang="en-US"/>
           </a:p>
@@ -2387,7 +2388,7 @@
           <a:p>
             <a:fld id="{F2CF84AC-730A-472F-B1D8-F72CDD076E52}" type="datetimeFigureOut">
               <a:rPr lang="en-US" smtClean="0"/>
-              <a:t>1/27/2024</a:t>
+              <a:t>1/28/2024</a:t>
             </a:fld>
             <a:endParaRPr lang="en-US"/>
           </a:p>
@@ -2675,7 +2676,7 @@
           <a:p>
             <a:fld id="{F2CF84AC-730A-472F-B1D8-F72CDD076E52}" type="datetimeFigureOut">
               <a:rPr lang="en-US" smtClean="0"/>
-              <a:t>1/27/2024</a:t>
+              <a:t>1/28/2024</a:t>
             </a:fld>
             <a:endParaRPr lang="en-US"/>
           </a:p>
@@ -2916,7 +2917,7 @@
           <a:p>
             <a:fld id="{F2CF84AC-730A-472F-B1D8-F72CDD076E52}" type="datetimeFigureOut">
               <a:rPr lang="en-US" smtClean="0"/>
-              <a:t>1/27/2024</a:t>
+              <a:t>1/28/2024</a:t>
             </a:fld>
             <a:endParaRPr lang="en-US"/>
           </a:p>
@@ -5815,6 +5816,249 @@
 </p:sld>
 </file>
 
+<file path=ppt/slides/slide9.xml><?xml version="1.0" encoding="utf-8"?>
+<p:sld xmlns:a="http://schemas.openxmlformats.org/drawingml/2006/main" xmlns:r="http://schemas.openxmlformats.org/officeDocument/2006/relationships" xmlns:p="http://schemas.openxmlformats.org/presentationml/2006/main">
+  <p:cSld>
+    <p:spTree>
+      <p:nvGrpSpPr>
+        <p:cNvPr id="1" name=""/>
+        <p:cNvGrpSpPr/>
+        <p:nvPr/>
+      </p:nvGrpSpPr>
+      <p:grpSpPr>
+        <a:xfrm>
+          <a:off x="0" y="0"/>
+          <a:ext cx="0" cy="0"/>
+          <a:chOff x="0" y="0"/>
+          <a:chExt cx="0" cy="0"/>
+        </a:xfrm>
+      </p:grpSpPr>
+      <p:sp>
+        <p:nvSpPr>
+          <p:cNvPr id="5" name="Rectangle 4">
+            <a:extLst>
+              <a:ext uri="{FF2B5EF4-FFF2-40B4-BE49-F238E27FC236}">
+                <a16:creationId xmlns:a16="http://schemas.microsoft.com/office/drawing/2014/main" id="{DDD830C7-24F0-9FEC-37D9-BF046690C4A9}"/>
+              </a:ext>
+            </a:extLst>
+          </p:cNvPr>
+          <p:cNvSpPr/>
+          <p:nvPr/>
+        </p:nvSpPr>
+        <p:spPr>
+          <a:xfrm>
+            <a:off x="4937374" y="1488681"/>
+            <a:ext cx="1440602" cy="2337063"/>
+          </a:xfrm>
+          <a:prstGeom prst="rect">
+            <a:avLst/>
+          </a:prstGeom>
+          <a:solidFill>
+            <a:schemeClr val="tx1"/>
+          </a:solidFill>
+        </p:spPr>
+        <p:style>
+          <a:lnRef idx="2">
+            <a:schemeClr val="accent1">
+              <a:shade val="15000"/>
+            </a:schemeClr>
+          </a:lnRef>
+          <a:fillRef idx="1">
+            <a:schemeClr val="accent1"/>
+          </a:fillRef>
+          <a:effectRef idx="0">
+            <a:schemeClr val="accent1"/>
+          </a:effectRef>
+          <a:fontRef idx="minor">
+            <a:schemeClr val="lt1"/>
+          </a:fontRef>
+        </p:style>
+        <p:txBody>
+          <a:bodyPr rtlCol="0" anchor="ctr"/>
+          <a:lstStyle/>
+          <a:p>
+            <a:pPr algn="ctr"/>
+            <a:endParaRPr lang="en-US" dirty="0"/>
+          </a:p>
+        </p:txBody>
+      </p:sp>
+      <p:pic>
+        <p:nvPicPr>
+          <p:cNvPr id="3" name="Graphic 2" descr="Hamburger Menu Icon with solid fill">
+            <a:extLst>
+              <a:ext uri="{FF2B5EF4-FFF2-40B4-BE49-F238E27FC236}">
+                <a16:creationId xmlns:a16="http://schemas.microsoft.com/office/drawing/2014/main" id="{452B5BDA-4E21-2837-CA7D-965CA7B90282}"/>
+              </a:ext>
+            </a:extLst>
+          </p:cNvPr>
+          <p:cNvPicPr>
+            <a:picLocks noChangeAspect="1"/>
+          </p:cNvPicPr>
+          <p:nvPr/>
+        </p:nvPicPr>
+        <p:blipFill>
+          <a:blip r:embed="rId2">
+            <a:extLst>
+              <a:ext uri="{28A0092B-C50C-407E-A947-70E740481C1C}">
+                <a14:useLocalDpi xmlns:a14="http://schemas.microsoft.com/office/drawing/2010/main" val="0"/>
+              </a:ext>
+              <a:ext uri="{96DAC541-7B7A-43D3-8B79-37D633B846F1}">
+                <asvg:svgBlip xmlns:asvg="http://schemas.microsoft.com/office/drawing/2016/SVG/main" r:embed="rId3"/>
+              </a:ext>
+            </a:extLst>
+          </a:blip>
+          <a:stretch>
+            <a:fillRect/>
+          </a:stretch>
+        </p:blipFill>
+        <p:spPr>
+          <a:xfrm>
+            <a:off x="3742888" y="2309070"/>
+            <a:ext cx="914400" cy="914400"/>
+          </a:xfrm>
+          <a:prstGeom prst="rect">
+            <a:avLst/>
+          </a:prstGeom>
+        </p:spPr>
+      </p:pic>
+      <p:pic>
+        <p:nvPicPr>
+          <p:cNvPr id="4" name="Graphic 3" descr="Hamburger Menu Icon with solid fill">
+            <a:extLst>
+              <a:ext uri="{FF2B5EF4-FFF2-40B4-BE49-F238E27FC236}">
+                <a16:creationId xmlns:a16="http://schemas.microsoft.com/office/drawing/2014/main" id="{960701F7-6C7B-36C8-DB74-E2969641C695}"/>
+              </a:ext>
+            </a:extLst>
+          </p:cNvPr>
+          <p:cNvPicPr>
+            <a:picLocks noChangeAspect="1"/>
+          </p:cNvPicPr>
+          <p:nvPr/>
+        </p:nvPicPr>
+        <p:blipFill rotWithShape="1">
+          <a:blip r:embed="rId4">
+            <a:extLst>
+              <a:ext uri="{28A0092B-C50C-407E-A947-70E740481C1C}">
+                <a14:useLocalDpi xmlns:a14="http://schemas.microsoft.com/office/drawing/2010/main" val="0"/>
+              </a:ext>
+              <a:ext uri="{96DAC541-7B7A-43D3-8B79-37D633B846F1}">
+                <asvg:svgBlip xmlns:asvg="http://schemas.microsoft.com/office/drawing/2016/SVG/main" r:embed="rId5"/>
+              </a:ext>
+            </a:extLst>
+          </a:blip>
+          <a:srcRect l="9723" t="16575" r="9374" b="17107"/>
+          <a:stretch/>
+        </p:blipFill>
+        <p:spPr>
+          <a:xfrm>
+            <a:off x="5283202" y="2460625"/>
+            <a:ext cx="606423" cy="606425"/>
+          </a:xfrm>
+          <a:prstGeom prst="rect">
+            <a:avLst/>
+          </a:prstGeom>
+        </p:spPr>
+      </p:pic>
+      <p:sp>
+        <p:nvSpPr>
+          <p:cNvPr id="2" name="Rectangle 1">
+            <a:extLst>
+              <a:ext uri="{FF2B5EF4-FFF2-40B4-BE49-F238E27FC236}">
+                <a16:creationId xmlns:a16="http://schemas.microsoft.com/office/drawing/2014/main" id="{C8993FD1-4876-C9F7-D059-F8FC58D7ACF9}"/>
+              </a:ext>
+            </a:extLst>
+          </p:cNvPr>
+          <p:cNvSpPr/>
+          <p:nvPr/>
+        </p:nvSpPr>
+        <p:spPr>
+          <a:xfrm>
+            <a:off x="6377976" y="1488681"/>
+            <a:ext cx="1440602" cy="2337063"/>
+          </a:xfrm>
+          <a:prstGeom prst="rect">
+            <a:avLst/>
+          </a:prstGeom>
+          <a:solidFill>
+            <a:schemeClr val="tx1"/>
+          </a:solidFill>
+        </p:spPr>
+        <p:style>
+          <a:lnRef idx="2">
+            <a:schemeClr val="accent1">
+              <a:shade val="15000"/>
+            </a:schemeClr>
+          </a:lnRef>
+          <a:fillRef idx="1">
+            <a:schemeClr val="accent1"/>
+          </a:fillRef>
+          <a:effectRef idx="0">
+            <a:schemeClr val="accent1"/>
+          </a:effectRef>
+          <a:fontRef idx="minor">
+            <a:schemeClr val="lt1"/>
+          </a:fontRef>
+        </p:style>
+        <p:txBody>
+          <a:bodyPr rtlCol="0" anchor="ctr"/>
+          <a:lstStyle/>
+          <a:p>
+            <a:pPr algn="ctr"/>
+            <a:endParaRPr lang="en-US" dirty="0"/>
+          </a:p>
+        </p:txBody>
+      </p:sp>
+      <p:pic>
+        <p:nvPicPr>
+          <p:cNvPr id="9" name="Graphic 8" descr="User with solid fill">
+            <a:extLst>
+              <a:ext uri="{FF2B5EF4-FFF2-40B4-BE49-F238E27FC236}">
+                <a16:creationId xmlns:a16="http://schemas.microsoft.com/office/drawing/2014/main" id="{2422ABCA-6D8C-F8B7-0183-9CA22026B5BC}"/>
+              </a:ext>
+            </a:extLst>
+          </p:cNvPr>
+          <p:cNvPicPr>
+            <a:picLocks noChangeAspect="1"/>
+          </p:cNvPicPr>
+          <p:nvPr/>
+        </p:nvPicPr>
+        <p:blipFill rotWithShape="1">
+          <a:blip r:embed="rId6">
+            <a:extLst>
+              <a:ext uri="{28A0092B-C50C-407E-A947-70E740481C1C}">
+                <a14:useLocalDpi xmlns:a14="http://schemas.microsoft.com/office/drawing/2010/main" val="0"/>
+              </a:ext>
+              <a:ext uri="{96DAC541-7B7A-43D3-8B79-37D633B846F1}">
+                <asvg:svgBlip xmlns:asvg="http://schemas.microsoft.com/office/drawing/2016/SVG/main" r:embed="rId7"/>
+              </a:ext>
+            </a:extLst>
+          </a:blip>
+          <a:srcRect l="13525" t="11270" r="13618" b="11592"/>
+          <a:stretch/>
+        </p:blipFill>
+        <p:spPr>
+          <a:xfrm>
+            <a:off x="5245101" y="1671441"/>
+            <a:ext cx="606423" cy="606425"/>
+          </a:xfrm>
+          <a:prstGeom prst="rect">
+            <a:avLst/>
+          </a:prstGeom>
+        </p:spPr>
+      </p:pic>
+    </p:spTree>
+    <p:extLst>
+      <p:ext uri="{BB962C8B-B14F-4D97-AF65-F5344CB8AC3E}">
+        <p14:creationId xmlns:p14="http://schemas.microsoft.com/office/powerpoint/2010/main" val="1726245575"/>
+      </p:ext>
+    </p:extLst>
+  </p:cSld>
+  <p:clrMapOvr>
+    <a:masterClrMapping/>
+  </p:clrMapOvr>
+</p:sld>
+</file>
+
 <file path=ppt/theme/theme1.xml><?xml version="1.0" encoding="utf-8"?>
 <a:theme xmlns:a="http://schemas.openxmlformats.org/drawingml/2006/main" name="Office Theme">
   <a:themeElements>

</xml_diff>

<commit_message>
added video player & buttons (arrow keys and clicks) to the homepage tutorial
</commit_message>
<xml_diff>
--- a/Event Organizer App/app_images/App_Images.pptx
+++ b/Event Organizer App/app_images/App_Images.pptx
@@ -14,6 +14,7 @@
     <p:sldId id="260" r:id="rId8"/>
     <p:sldId id="264" r:id="rId9"/>
     <p:sldId id="265" r:id="rId10"/>
+    <p:sldId id="266" r:id="rId11"/>
   </p:sldIdLst>
   <p:sldSz cx="12192000" cy="6858000"/>
   <p:notesSz cx="6858000" cy="9144000"/>
@@ -267,7 +268,7 @@
           <a:p>
             <a:fld id="{F2CF84AC-730A-472F-B1D8-F72CDD076E52}" type="datetimeFigureOut">
               <a:rPr lang="en-US" smtClean="0"/>
-              <a:t>1/28/2024</a:t>
+              <a:t>2/4/2024</a:t>
             </a:fld>
             <a:endParaRPr lang="en-US"/>
           </a:p>
@@ -465,7 +466,7 @@
           <a:p>
             <a:fld id="{F2CF84AC-730A-472F-B1D8-F72CDD076E52}" type="datetimeFigureOut">
               <a:rPr lang="en-US" smtClean="0"/>
-              <a:t>1/28/2024</a:t>
+              <a:t>2/4/2024</a:t>
             </a:fld>
             <a:endParaRPr lang="en-US"/>
           </a:p>
@@ -673,7 +674,7 @@
           <a:p>
             <a:fld id="{F2CF84AC-730A-472F-B1D8-F72CDD076E52}" type="datetimeFigureOut">
               <a:rPr lang="en-US" smtClean="0"/>
-              <a:t>1/28/2024</a:t>
+              <a:t>2/4/2024</a:t>
             </a:fld>
             <a:endParaRPr lang="en-US"/>
           </a:p>
@@ -871,7 +872,7 @@
           <a:p>
             <a:fld id="{F2CF84AC-730A-472F-B1D8-F72CDD076E52}" type="datetimeFigureOut">
               <a:rPr lang="en-US" smtClean="0"/>
-              <a:t>1/28/2024</a:t>
+              <a:t>2/4/2024</a:t>
             </a:fld>
             <a:endParaRPr lang="en-US"/>
           </a:p>
@@ -1146,7 +1147,7 @@
           <a:p>
             <a:fld id="{F2CF84AC-730A-472F-B1D8-F72CDD076E52}" type="datetimeFigureOut">
               <a:rPr lang="en-US" smtClean="0"/>
-              <a:t>1/28/2024</a:t>
+              <a:t>2/4/2024</a:t>
             </a:fld>
             <a:endParaRPr lang="en-US"/>
           </a:p>
@@ -1411,7 +1412,7 @@
           <a:p>
             <a:fld id="{F2CF84AC-730A-472F-B1D8-F72CDD076E52}" type="datetimeFigureOut">
               <a:rPr lang="en-US" smtClean="0"/>
-              <a:t>1/28/2024</a:t>
+              <a:t>2/4/2024</a:t>
             </a:fld>
             <a:endParaRPr lang="en-US"/>
           </a:p>
@@ -1823,7 +1824,7 @@
           <a:p>
             <a:fld id="{F2CF84AC-730A-472F-B1D8-F72CDD076E52}" type="datetimeFigureOut">
               <a:rPr lang="en-US" smtClean="0"/>
-              <a:t>1/28/2024</a:t>
+              <a:t>2/4/2024</a:t>
             </a:fld>
             <a:endParaRPr lang="en-US"/>
           </a:p>
@@ -1964,7 +1965,7 @@
           <a:p>
             <a:fld id="{F2CF84AC-730A-472F-B1D8-F72CDD076E52}" type="datetimeFigureOut">
               <a:rPr lang="en-US" smtClean="0"/>
-              <a:t>1/28/2024</a:t>
+              <a:t>2/4/2024</a:t>
             </a:fld>
             <a:endParaRPr lang="en-US"/>
           </a:p>
@@ -2077,7 +2078,7 @@
           <a:p>
             <a:fld id="{F2CF84AC-730A-472F-B1D8-F72CDD076E52}" type="datetimeFigureOut">
               <a:rPr lang="en-US" smtClean="0"/>
-              <a:t>1/28/2024</a:t>
+              <a:t>2/4/2024</a:t>
             </a:fld>
             <a:endParaRPr lang="en-US"/>
           </a:p>
@@ -2388,7 +2389,7 @@
           <a:p>
             <a:fld id="{F2CF84AC-730A-472F-B1D8-F72CDD076E52}" type="datetimeFigureOut">
               <a:rPr lang="en-US" smtClean="0"/>
-              <a:t>1/28/2024</a:t>
+              <a:t>2/4/2024</a:t>
             </a:fld>
             <a:endParaRPr lang="en-US"/>
           </a:p>
@@ -2676,7 +2677,7 @@
           <a:p>
             <a:fld id="{F2CF84AC-730A-472F-B1D8-F72CDD076E52}" type="datetimeFigureOut">
               <a:rPr lang="en-US" smtClean="0"/>
-              <a:t>1/28/2024</a:t>
+              <a:t>2/4/2024</a:t>
             </a:fld>
             <a:endParaRPr lang="en-US"/>
           </a:p>
@@ -2917,7 +2918,7 @@
           <a:p>
             <a:fld id="{F2CF84AC-730A-472F-B1D8-F72CDD076E52}" type="datetimeFigureOut">
               <a:rPr lang="en-US" smtClean="0"/>
-              <a:t>1/28/2024</a:t>
+              <a:t>2/4/2024</a:t>
             </a:fld>
             <a:endParaRPr lang="en-US"/>
           </a:p>
@@ -3874,6 +3875,361 @@
     <p:extLst>
       <p:ext uri="{BB962C8B-B14F-4D97-AF65-F5344CB8AC3E}">
         <p14:creationId xmlns:p14="http://schemas.microsoft.com/office/powerpoint/2010/main" val="1252605456"/>
+      </p:ext>
+    </p:extLst>
+  </p:cSld>
+  <p:clrMapOvr>
+    <a:masterClrMapping/>
+  </p:clrMapOvr>
+</p:sld>
+</file>
+
+<file path=ppt/slides/slide10.xml><?xml version="1.0" encoding="utf-8"?>
+<p:sld xmlns:a="http://schemas.openxmlformats.org/drawingml/2006/main" xmlns:r="http://schemas.openxmlformats.org/officeDocument/2006/relationships" xmlns:p="http://schemas.openxmlformats.org/presentationml/2006/main">
+  <p:cSld>
+    <p:spTree>
+      <p:nvGrpSpPr>
+        <p:cNvPr id="1" name="">
+          <a:extLst>
+            <a:ext uri="{FF2B5EF4-FFF2-40B4-BE49-F238E27FC236}">
+              <a16:creationId xmlns:a16="http://schemas.microsoft.com/office/drawing/2014/main" id="{4DFA6566-6299-5391-0DF6-5283295349CD}"/>
+            </a:ext>
+          </a:extLst>
+        </p:cNvPr>
+        <p:cNvGrpSpPr/>
+        <p:nvPr/>
+      </p:nvGrpSpPr>
+      <p:grpSpPr>
+        <a:xfrm>
+          <a:off x="0" y="0"/>
+          <a:ext cx="0" cy="0"/>
+          <a:chOff x="0" y="0"/>
+          <a:chExt cx="0" cy="0"/>
+        </a:xfrm>
+      </p:grpSpPr>
+      <p:sp>
+        <p:nvSpPr>
+          <p:cNvPr id="5" name="Rectangle 4">
+            <a:extLst>
+              <a:ext uri="{FF2B5EF4-FFF2-40B4-BE49-F238E27FC236}">
+                <a16:creationId xmlns:a16="http://schemas.microsoft.com/office/drawing/2014/main" id="{67D2F641-A772-E199-3CFD-3487F037C782}"/>
+              </a:ext>
+            </a:extLst>
+          </p:cNvPr>
+          <p:cNvSpPr/>
+          <p:nvPr/>
+        </p:nvSpPr>
+        <p:spPr>
+          <a:xfrm>
+            <a:off x="4937374" y="1488681"/>
+            <a:ext cx="1440602" cy="2337063"/>
+          </a:xfrm>
+          <a:prstGeom prst="rect">
+            <a:avLst/>
+          </a:prstGeom>
+          <a:solidFill>
+            <a:schemeClr val="tx1"/>
+          </a:solidFill>
+        </p:spPr>
+        <p:style>
+          <a:lnRef idx="2">
+            <a:schemeClr val="accent1">
+              <a:shade val="15000"/>
+            </a:schemeClr>
+          </a:lnRef>
+          <a:fillRef idx="1">
+            <a:schemeClr val="accent1"/>
+          </a:fillRef>
+          <a:effectRef idx="0">
+            <a:schemeClr val="accent1"/>
+          </a:effectRef>
+          <a:fontRef idx="minor">
+            <a:schemeClr val="lt1"/>
+          </a:fontRef>
+        </p:style>
+        <p:txBody>
+          <a:bodyPr rtlCol="0" anchor="ctr"/>
+          <a:lstStyle/>
+          <a:p>
+            <a:pPr algn="ctr"/>
+            <a:endParaRPr lang="en-US" dirty="0"/>
+          </a:p>
+        </p:txBody>
+      </p:sp>
+      <p:pic>
+        <p:nvPicPr>
+          <p:cNvPr id="3" name="Graphic 2" descr="Hamburger Menu Icon with solid fill">
+            <a:extLst>
+              <a:ext uri="{FF2B5EF4-FFF2-40B4-BE49-F238E27FC236}">
+                <a16:creationId xmlns:a16="http://schemas.microsoft.com/office/drawing/2014/main" id="{016E77AA-F5A6-419A-4983-08721B20A836}"/>
+              </a:ext>
+            </a:extLst>
+          </p:cNvPr>
+          <p:cNvPicPr>
+            <a:picLocks noChangeAspect="1"/>
+          </p:cNvPicPr>
+          <p:nvPr/>
+        </p:nvPicPr>
+        <p:blipFill>
+          <a:blip r:embed="rId2">
+            <a:extLst>
+              <a:ext uri="{28A0092B-C50C-407E-A947-70E740481C1C}">
+                <a14:useLocalDpi xmlns:a14="http://schemas.microsoft.com/office/drawing/2010/main" val="0"/>
+              </a:ext>
+              <a:ext uri="{96DAC541-7B7A-43D3-8B79-37D633B846F1}">
+                <asvg:svgBlip xmlns:asvg="http://schemas.microsoft.com/office/drawing/2016/SVG/main" r:embed="rId3"/>
+              </a:ext>
+            </a:extLst>
+          </a:blip>
+          <a:stretch>
+            <a:fillRect/>
+          </a:stretch>
+        </p:blipFill>
+        <p:spPr>
+          <a:xfrm>
+            <a:off x="3742888" y="2309070"/>
+            <a:ext cx="914400" cy="914400"/>
+          </a:xfrm>
+          <a:prstGeom prst="rect">
+            <a:avLst/>
+          </a:prstGeom>
+        </p:spPr>
+      </p:pic>
+      <p:pic>
+        <p:nvPicPr>
+          <p:cNvPr id="4" name="Graphic 3" descr="Hamburger Menu Icon with solid fill">
+            <a:extLst>
+              <a:ext uri="{FF2B5EF4-FFF2-40B4-BE49-F238E27FC236}">
+                <a16:creationId xmlns:a16="http://schemas.microsoft.com/office/drawing/2014/main" id="{EB0943CA-9436-F737-992A-E8DB7E0FAC10}"/>
+              </a:ext>
+            </a:extLst>
+          </p:cNvPr>
+          <p:cNvPicPr>
+            <a:picLocks noChangeAspect="1"/>
+          </p:cNvPicPr>
+          <p:nvPr/>
+        </p:nvPicPr>
+        <p:blipFill rotWithShape="1">
+          <a:blip r:embed="rId4">
+            <a:extLst>
+              <a:ext uri="{28A0092B-C50C-407E-A947-70E740481C1C}">
+                <a14:useLocalDpi xmlns:a14="http://schemas.microsoft.com/office/drawing/2010/main" val="0"/>
+              </a:ext>
+              <a:ext uri="{96DAC541-7B7A-43D3-8B79-37D633B846F1}">
+                <asvg:svgBlip xmlns:asvg="http://schemas.microsoft.com/office/drawing/2016/SVG/main" r:embed="rId5"/>
+              </a:ext>
+            </a:extLst>
+          </a:blip>
+          <a:srcRect l="9723" t="16575" r="9374" b="17107"/>
+          <a:stretch/>
+        </p:blipFill>
+        <p:spPr>
+          <a:xfrm>
+            <a:off x="5283202" y="2460625"/>
+            <a:ext cx="606423" cy="606425"/>
+          </a:xfrm>
+          <a:prstGeom prst="rect">
+            <a:avLst/>
+          </a:prstGeom>
+        </p:spPr>
+      </p:pic>
+      <p:sp>
+        <p:nvSpPr>
+          <p:cNvPr id="2" name="Rectangle 1">
+            <a:extLst>
+              <a:ext uri="{FF2B5EF4-FFF2-40B4-BE49-F238E27FC236}">
+                <a16:creationId xmlns:a16="http://schemas.microsoft.com/office/drawing/2014/main" id="{745FB3F2-A94B-B4A1-1748-C8027D172067}"/>
+              </a:ext>
+            </a:extLst>
+          </p:cNvPr>
+          <p:cNvSpPr/>
+          <p:nvPr/>
+        </p:nvSpPr>
+        <p:spPr>
+          <a:xfrm>
+            <a:off x="6377976" y="1488681"/>
+            <a:ext cx="1440602" cy="2337063"/>
+          </a:xfrm>
+          <a:prstGeom prst="rect">
+            <a:avLst/>
+          </a:prstGeom>
+          <a:solidFill>
+            <a:schemeClr val="tx1"/>
+          </a:solidFill>
+        </p:spPr>
+        <p:style>
+          <a:lnRef idx="2">
+            <a:schemeClr val="accent1">
+              <a:shade val="15000"/>
+            </a:schemeClr>
+          </a:lnRef>
+          <a:fillRef idx="1">
+            <a:schemeClr val="accent1"/>
+          </a:fillRef>
+          <a:effectRef idx="0">
+            <a:schemeClr val="accent1"/>
+          </a:effectRef>
+          <a:fontRef idx="minor">
+            <a:schemeClr val="lt1"/>
+          </a:fontRef>
+        </p:style>
+        <p:txBody>
+          <a:bodyPr rtlCol="0" anchor="ctr"/>
+          <a:lstStyle/>
+          <a:p>
+            <a:pPr algn="ctr"/>
+            <a:endParaRPr lang="en-US" dirty="0"/>
+          </a:p>
+        </p:txBody>
+      </p:sp>
+      <p:pic>
+        <p:nvPicPr>
+          <p:cNvPr id="9" name="Graphic 8" descr="User with solid fill">
+            <a:extLst>
+              <a:ext uri="{FF2B5EF4-FFF2-40B4-BE49-F238E27FC236}">
+                <a16:creationId xmlns:a16="http://schemas.microsoft.com/office/drawing/2014/main" id="{59F65DD2-B095-A520-A209-AD006ABC71CD}"/>
+              </a:ext>
+            </a:extLst>
+          </p:cNvPr>
+          <p:cNvPicPr>
+            <a:picLocks noChangeAspect="1"/>
+          </p:cNvPicPr>
+          <p:nvPr/>
+        </p:nvPicPr>
+        <p:blipFill rotWithShape="1">
+          <a:blip r:embed="rId6">
+            <a:extLst>
+              <a:ext uri="{28A0092B-C50C-407E-A947-70E740481C1C}">
+                <a14:useLocalDpi xmlns:a14="http://schemas.microsoft.com/office/drawing/2010/main" val="0"/>
+              </a:ext>
+              <a:ext uri="{96DAC541-7B7A-43D3-8B79-37D633B846F1}">
+                <asvg:svgBlip xmlns:asvg="http://schemas.microsoft.com/office/drawing/2016/SVG/main" r:embed="rId7"/>
+              </a:ext>
+            </a:extLst>
+          </a:blip>
+          <a:srcRect l="13525" t="11270" r="13618" b="11592"/>
+          <a:stretch/>
+        </p:blipFill>
+        <p:spPr>
+          <a:xfrm>
+            <a:off x="5245101" y="1671441"/>
+            <a:ext cx="606423" cy="606425"/>
+          </a:xfrm>
+          <a:prstGeom prst="rect">
+            <a:avLst/>
+          </a:prstGeom>
+        </p:spPr>
+      </p:pic>
+      <p:sp>
+        <p:nvSpPr>
+          <p:cNvPr id="6" name="Flowchart: Connector 5">
+            <a:extLst>
+              <a:ext uri="{FF2B5EF4-FFF2-40B4-BE49-F238E27FC236}">
+                <a16:creationId xmlns:a16="http://schemas.microsoft.com/office/drawing/2014/main" id="{ED900E07-6E60-AA99-D45E-13FC394A347E}"/>
+              </a:ext>
+            </a:extLst>
+          </p:cNvPr>
+          <p:cNvSpPr/>
+          <p:nvPr/>
+        </p:nvSpPr>
+        <p:spPr>
+          <a:xfrm>
+            <a:off x="6796525" y="1705566"/>
+            <a:ext cx="603504" cy="603504"/>
+          </a:xfrm>
+          <a:prstGeom prst="flowChartConnector">
+            <a:avLst/>
+          </a:prstGeom>
+          <a:solidFill>
+            <a:schemeClr val="bg1"/>
+          </a:solidFill>
+          <a:ln>
+            <a:solidFill>
+              <a:schemeClr val="bg1"/>
+            </a:solidFill>
+          </a:ln>
+        </p:spPr>
+        <p:style>
+          <a:lnRef idx="2">
+            <a:schemeClr val="accent1">
+              <a:shade val="15000"/>
+            </a:schemeClr>
+          </a:lnRef>
+          <a:fillRef idx="1">
+            <a:schemeClr val="accent1"/>
+          </a:fillRef>
+          <a:effectRef idx="0">
+            <a:schemeClr val="accent1"/>
+          </a:effectRef>
+          <a:fontRef idx="minor">
+            <a:schemeClr val="lt1"/>
+          </a:fontRef>
+        </p:style>
+        <p:txBody>
+          <a:bodyPr rtlCol="0" anchor="ctr"/>
+          <a:lstStyle/>
+          <a:p>
+            <a:pPr algn="ctr"/>
+            <a:endParaRPr lang="en-US"/>
+          </a:p>
+        </p:txBody>
+      </p:sp>
+      <p:sp>
+        <p:nvSpPr>
+          <p:cNvPr id="7" name="Flowchart: Connector 6">
+            <a:extLst>
+              <a:ext uri="{FF2B5EF4-FFF2-40B4-BE49-F238E27FC236}">
+                <a16:creationId xmlns:a16="http://schemas.microsoft.com/office/drawing/2014/main" id="{60B65818-E437-B7E6-1722-BDB904D29087}"/>
+              </a:ext>
+            </a:extLst>
+          </p:cNvPr>
+          <p:cNvSpPr/>
+          <p:nvPr/>
+        </p:nvSpPr>
+        <p:spPr>
+          <a:xfrm>
+            <a:off x="6796525" y="2619966"/>
+            <a:ext cx="603504" cy="603504"/>
+          </a:xfrm>
+          <a:prstGeom prst="flowChartConnector">
+            <a:avLst/>
+          </a:prstGeom>
+          <a:noFill/>
+          <a:ln>
+            <a:solidFill>
+              <a:schemeClr val="bg1"/>
+            </a:solidFill>
+          </a:ln>
+        </p:spPr>
+        <p:style>
+          <a:lnRef idx="2">
+            <a:schemeClr val="accent1">
+              <a:shade val="15000"/>
+            </a:schemeClr>
+          </a:lnRef>
+          <a:fillRef idx="1">
+            <a:schemeClr val="accent1"/>
+          </a:fillRef>
+          <a:effectRef idx="0">
+            <a:schemeClr val="accent1"/>
+          </a:effectRef>
+          <a:fontRef idx="minor">
+            <a:schemeClr val="lt1"/>
+          </a:fontRef>
+        </p:style>
+        <p:txBody>
+          <a:bodyPr rtlCol="0" anchor="ctr"/>
+          <a:lstStyle/>
+          <a:p>
+            <a:pPr algn="ctr"/>
+            <a:endParaRPr lang="en-US"/>
+          </a:p>
+        </p:txBody>
+      </p:sp>
+    </p:spTree>
+    <p:extLst>
+      <p:ext uri="{BB962C8B-B14F-4D97-AF65-F5344CB8AC3E}">
+        <p14:creationId xmlns:p14="http://schemas.microsoft.com/office/powerpoint/2010/main" val="4127829479"/>
       </p:ext>
     </p:extLst>
   </p:cSld>

</xml_diff>